<commit_message>
Se agregan los slides de Pedro Tellez 13_14_15
</commit_message>
<xml_diff>
--- a/Grupo 3/Presentación identidad digital.pptx
+++ b/Grupo 3/Presentación identidad digital.pptx
@@ -6,25 +6,27 @@
   </p:sldMasterIdLst>
   <p:sldIdLst>
     <p:sldId id="274" r:id="rId2"/>
-    <p:sldId id="256" r:id="rId3"/>
-    <p:sldId id="257" r:id="rId4"/>
-    <p:sldId id="258" r:id="rId5"/>
-    <p:sldId id="259" r:id="rId6"/>
-    <p:sldId id="260" r:id="rId7"/>
-    <p:sldId id="261" r:id="rId8"/>
-    <p:sldId id="262" r:id="rId9"/>
-    <p:sldId id="263" r:id="rId10"/>
-    <p:sldId id="264" r:id="rId11"/>
-    <p:sldId id="265" r:id="rId12"/>
-    <p:sldId id="266" r:id="rId13"/>
-    <p:sldId id="279" r:id="rId14"/>
-    <p:sldId id="268" r:id="rId15"/>
-    <p:sldId id="269" r:id="rId16"/>
-    <p:sldId id="270" r:id="rId17"/>
-    <p:sldId id="271" r:id="rId18"/>
-    <p:sldId id="272" r:id="rId19"/>
-    <p:sldId id="273" r:id="rId20"/>
-    <p:sldId id="275" r:id="rId21"/>
+    <p:sldId id="280" r:id="rId3"/>
+    <p:sldId id="281" r:id="rId4"/>
+    <p:sldId id="282" r:id="rId5"/>
+    <p:sldId id="257" r:id="rId6"/>
+    <p:sldId id="258" r:id="rId7"/>
+    <p:sldId id="259" r:id="rId8"/>
+    <p:sldId id="260" r:id="rId9"/>
+    <p:sldId id="261" r:id="rId10"/>
+    <p:sldId id="262" r:id="rId11"/>
+    <p:sldId id="263" r:id="rId12"/>
+    <p:sldId id="264" r:id="rId13"/>
+    <p:sldId id="265" r:id="rId14"/>
+    <p:sldId id="266" r:id="rId15"/>
+    <p:sldId id="279" r:id="rId16"/>
+    <p:sldId id="268" r:id="rId17"/>
+    <p:sldId id="269" r:id="rId18"/>
+    <p:sldId id="270" r:id="rId19"/>
+    <p:sldId id="271" r:id="rId20"/>
+    <p:sldId id="272" r:id="rId21"/>
+    <p:sldId id="273" r:id="rId22"/>
+    <p:sldId id="275" r:id="rId23"/>
   </p:sldIdLst>
   <p:sldSz cx="12192000" cy="6858000"/>
   <p:notesSz cx="6858000" cy="9144000"/>
@@ -3559,6 +3561,194 @@
           <p:cNvPr id="2" name="Título 1">
             <a:extLst>
               <a:ext uri="{FF2B5EF4-FFF2-40B4-BE49-F238E27FC236}">
+                <a16:creationId xmlns:a16="http://schemas.microsoft.com/office/drawing/2014/main" id="{C96D7D7A-8958-4FA2-B276-117158E345E0}"/>
+              </a:ext>
+            </a:extLst>
+          </p:cNvPr>
+          <p:cNvSpPr>
+            <a:spLocks noGrp="1"/>
+          </p:cNvSpPr>
+          <p:nvPr>
+            <p:ph type="title"/>
+          </p:nvPr>
+        </p:nvSpPr>
+        <p:spPr/>
+        <p:txBody>
+          <a:bodyPr/>
+          <a:lstStyle/>
+          <a:p>
+            <a:r>
+              <a:rPr lang="es-MX" dirty="0" err="1"/>
+              <a:t>Raul</a:t>
+            </a:r>
+            <a:r>
+              <a:rPr lang="es-MX" dirty="0"/>
+              <a:t> Garay</a:t>
+            </a:r>
+            <a:endParaRPr lang="es-CO" dirty="0"/>
+          </a:p>
+        </p:txBody>
+      </p:sp>
+      <p:sp>
+        <p:nvSpPr>
+          <p:cNvPr id="3" name="Marcador de contenido 2">
+            <a:extLst>
+              <a:ext uri="{FF2B5EF4-FFF2-40B4-BE49-F238E27FC236}">
+                <a16:creationId xmlns:a16="http://schemas.microsoft.com/office/drawing/2014/main" id="{80C5BB57-E45C-47FD-8AC8-E5D3BE66B2A4}"/>
+              </a:ext>
+            </a:extLst>
+          </p:cNvPr>
+          <p:cNvSpPr>
+            <a:spLocks noGrp="1"/>
+          </p:cNvSpPr>
+          <p:nvPr>
+            <p:ph idx="1"/>
+          </p:nvPr>
+        </p:nvSpPr>
+        <p:spPr/>
+        <p:txBody>
+          <a:bodyPr/>
+          <a:lstStyle/>
+          <a:p>
+            <a:endParaRPr lang="es-CO"/>
+          </a:p>
+        </p:txBody>
+      </p:sp>
+    </p:spTree>
+    <p:extLst>
+      <p:ext uri="{BB962C8B-B14F-4D97-AF65-F5344CB8AC3E}">
+        <p14:creationId xmlns:p14="http://schemas.microsoft.com/office/powerpoint/2010/main" val="2095245258"/>
+      </p:ext>
+    </p:extLst>
+  </p:cSld>
+  <p:clrMapOvr>
+    <a:masterClrMapping/>
+  </p:clrMapOvr>
+  <mc:AlternateContent xmlns:mc="http://schemas.openxmlformats.org/markup-compatibility/2006" xmlns:p14="http://schemas.microsoft.com/office/powerpoint/2010/main">
+    <mc:Choice Requires="p14">
+      <p:transition p14:dur="10" advClick="0" advTm="5400000"/>
+    </mc:Choice>
+    <mc:Fallback xmlns="">
+      <p:transition advClick="0" advTm="5400000"/>
+    </mc:Fallback>
+  </mc:AlternateContent>
+</p:sld>
+</file>
+
+<file path=ppt/slides/slide11.xml><?xml version="1.0" encoding="utf-8"?>
+<p:sld xmlns:a="http://schemas.openxmlformats.org/drawingml/2006/main" xmlns:r="http://schemas.openxmlformats.org/officeDocument/2006/relationships" xmlns:p="http://schemas.openxmlformats.org/presentationml/2006/main">
+  <p:cSld>
+    <p:spTree>
+      <p:nvGrpSpPr>
+        <p:cNvPr id="1" name=""/>
+        <p:cNvGrpSpPr/>
+        <p:nvPr/>
+      </p:nvGrpSpPr>
+      <p:grpSpPr>
+        <a:xfrm>
+          <a:off x="0" y="0"/>
+          <a:ext cx="0" cy="0"/>
+          <a:chOff x="0" y="0"/>
+          <a:chExt cx="0" cy="0"/>
+        </a:xfrm>
+      </p:grpSpPr>
+      <p:sp>
+        <p:nvSpPr>
+          <p:cNvPr id="2" name="Título 1">
+            <a:extLst>
+              <a:ext uri="{FF2B5EF4-FFF2-40B4-BE49-F238E27FC236}">
+                <a16:creationId xmlns:a16="http://schemas.microsoft.com/office/drawing/2014/main" id="{075B7DE7-63C5-48E2-ABD6-C29042A28050}"/>
+              </a:ext>
+            </a:extLst>
+          </p:cNvPr>
+          <p:cNvSpPr>
+            <a:spLocks noGrp="1"/>
+          </p:cNvSpPr>
+          <p:nvPr>
+            <p:ph type="title"/>
+          </p:nvPr>
+        </p:nvSpPr>
+        <p:spPr/>
+        <p:txBody>
+          <a:bodyPr/>
+          <a:lstStyle/>
+          <a:p>
+            <a:r>
+              <a:rPr lang="es-MX" dirty="0"/>
+              <a:t>5.	Autenticación y acceso</a:t>
+            </a:r>
+            <a:endParaRPr lang="es-CO" dirty="0"/>
+          </a:p>
+        </p:txBody>
+      </p:sp>
+      <p:sp>
+        <p:nvSpPr>
+          <p:cNvPr id="3" name="Marcador de contenido 2">
+            <a:extLst>
+              <a:ext uri="{FF2B5EF4-FFF2-40B4-BE49-F238E27FC236}">
+                <a16:creationId xmlns:a16="http://schemas.microsoft.com/office/drawing/2014/main" id="{39C09A13-4035-4711-87ED-8DE3DE2ED9AA}"/>
+              </a:ext>
+            </a:extLst>
+          </p:cNvPr>
+          <p:cNvSpPr>
+            <a:spLocks noGrp="1"/>
+          </p:cNvSpPr>
+          <p:nvPr>
+            <p:ph idx="1"/>
+          </p:nvPr>
+        </p:nvSpPr>
+        <p:spPr/>
+        <p:txBody>
+          <a:bodyPr/>
+          <a:lstStyle/>
+          <a:p>
+            <a:endParaRPr lang="es-CO"/>
+          </a:p>
+        </p:txBody>
+      </p:sp>
+    </p:spTree>
+    <p:extLst>
+      <p:ext uri="{BB962C8B-B14F-4D97-AF65-F5344CB8AC3E}">
+        <p14:creationId xmlns:p14="http://schemas.microsoft.com/office/powerpoint/2010/main" val="1600950127"/>
+      </p:ext>
+    </p:extLst>
+  </p:cSld>
+  <p:clrMapOvr>
+    <a:masterClrMapping/>
+  </p:clrMapOvr>
+  <mc:AlternateContent xmlns:mc="http://schemas.openxmlformats.org/markup-compatibility/2006" xmlns:p14="http://schemas.microsoft.com/office/powerpoint/2010/main">
+    <mc:Choice Requires="p14">
+      <p:transition p14:dur="10" advClick="0" advTm="5400000"/>
+    </mc:Choice>
+    <mc:Fallback xmlns="">
+      <p:transition advClick="0" advTm="5400000"/>
+    </mc:Fallback>
+  </mc:AlternateContent>
+</p:sld>
+</file>
+
+<file path=ppt/slides/slide12.xml><?xml version="1.0" encoding="utf-8"?>
+<p:sld xmlns:a="http://schemas.openxmlformats.org/drawingml/2006/main" xmlns:r="http://schemas.openxmlformats.org/officeDocument/2006/relationships" xmlns:p="http://schemas.openxmlformats.org/presentationml/2006/main">
+  <p:cSld>
+    <p:spTree>
+      <p:nvGrpSpPr>
+        <p:cNvPr id="1" name=""/>
+        <p:cNvGrpSpPr/>
+        <p:nvPr/>
+      </p:nvGrpSpPr>
+      <p:grpSpPr>
+        <a:xfrm>
+          <a:off x="0" y="0"/>
+          <a:ext cx="0" cy="0"/>
+          <a:chOff x="0" y="0"/>
+          <a:chExt cx="0" cy="0"/>
+        </a:xfrm>
+      </p:grpSpPr>
+      <p:sp>
+        <p:nvSpPr>
+          <p:cNvPr id="2" name="Título 1">
+            <a:extLst>
+              <a:ext uri="{FF2B5EF4-FFF2-40B4-BE49-F238E27FC236}">
                 <a16:creationId xmlns:a16="http://schemas.microsoft.com/office/drawing/2014/main" id="{55E123AC-0D93-45D3-92F4-7F96A7BE8A99}"/>
               </a:ext>
             </a:extLst>
@@ -3629,7 +3819,7 @@
 </p:sld>
 </file>
 
-<file path=ppt/slides/slide11.xml><?xml version="1.0" encoding="utf-8"?>
+<file path=ppt/slides/slide13.xml><?xml version="1.0" encoding="utf-8"?>
 <p:sld xmlns:a="http://schemas.openxmlformats.org/drawingml/2006/main" xmlns:r="http://schemas.openxmlformats.org/officeDocument/2006/relationships" xmlns:p="http://schemas.openxmlformats.org/presentationml/2006/main">
   <p:cSld>
     <p:bg>
@@ -4630,7 +4820,7 @@
 </p:sld>
 </file>
 
-<file path=ppt/slides/slide12.xml><?xml version="1.0" encoding="utf-8"?>
+<file path=ppt/slides/slide14.xml><?xml version="1.0" encoding="utf-8"?>
 <p:sld xmlns:a="http://schemas.openxmlformats.org/drawingml/2006/main" xmlns:r="http://schemas.openxmlformats.org/officeDocument/2006/relationships" xmlns:p="http://schemas.openxmlformats.org/presentationml/2006/main">
   <p:cSld>
     <p:bg>
@@ -6952,7 +7142,7 @@
 </p:sld>
 </file>
 
-<file path=ppt/slides/slide13.xml><?xml version="1.0" encoding="utf-8"?>
+<file path=ppt/slides/slide15.xml><?xml version="1.0" encoding="utf-8"?>
 <p:sld xmlns:a="http://schemas.openxmlformats.org/drawingml/2006/main" xmlns:r="http://schemas.openxmlformats.org/officeDocument/2006/relationships" xmlns:p="http://schemas.openxmlformats.org/presentationml/2006/main">
   <p:cSld>
     <p:bg>
@@ -7427,11 +7617,11 @@
   <p:clrMapOvr>
     <a:masterClrMapping/>
   </p:clrMapOvr>
-  <mc:AlternateContent xmlns:mc="http://schemas.openxmlformats.org/markup-compatibility/2006">
-    <mc:Choice xmlns:p14="http://schemas.microsoft.com/office/powerpoint/2010/main" Requires="p14">
+  <mc:AlternateContent xmlns:mc="http://schemas.openxmlformats.org/markup-compatibility/2006" xmlns:p14="http://schemas.microsoft.com/office/powerpoint/2010/main">
+    <mc:Choice Requires="p14">
       <p:transition p14:dur="10" advClick="0" advTm="5400000"/>
     </mc:Choice>
-    <mc:Fallback>
+    <mc:Fallback xmlns="">
       <p:transition advClick="0" advTm="5400000"/>
     </mc:Fallback>
   </mc:AlternateContent>
@@ -7976,206 +8166,6 @@
 </p:sld>
 </file>
 
-<file path=ppt/slides/slide14.xml><?xml version="1.0" encoding="utf-8"?>
-<p:sld xmlns:a="http://schemas.openxmlformats.org/drawingml/2006/main" xmlns:r="http://schemas.openxmlformats.org/officeDocument/2006/relationships" xmlns:p="http://schemas.openxmlformats.org/presentationml/2006/main">
-  <p:cSld>
-    <p:spTree>
-      <p:nvGrpSpPr>
-        <p:cNvPr id="1" name=""/>
-        <p:cNvGrpSpPr/>
-        <p:nvPr/>
-      </p:nvGrpSpPr>
-      <p:grpSpPr>
-        <a:xfrm>
-          <a:off x="0" y="0"/>
-          <a:ext cx="0" cy="0"/>
-          <a:chOff x="0" y="0"/>
-          <a:chExt cx="0" cy="0"/>
-        </a:xfrm>
-      </p:grpSpPr>
-      <p:sp>
-        <p:nvSpPr>
-          <p:cNvPr id="2" name="Título 1">
-            <a:extLst>
-              <a:ext uri="{FF2B5EF4-FFF2-40B4-BE49-F238E27FC236}">
-                <a16:creationId xmlns:a16="http://schemas.microsoft.com/office/drawing/2014/main" id="{EDC3F24B-364C-4C44-82C5-2C13CE3059A0}"/>
-              </a:ext>
-            </a:extLst>
-          </p:cNvPr>
-          <p:cNvSpPr>
-            <a:spLocks noGrp="1"/>
-          </p:cNvSpPr>
-          <p:nvPr>
-            <p:ph type="title"/>
-          </p:nvPr>
-        </p:nvSpPr>
-        <p:spPr/>
-        <p:txBody>
-          <a:bodyPr/>
-          <a:lstStyle/>
-          <a:p>
-            <a:r>
-              <a:rPr lang="es-MX" dirty="0"/>
-              <a:t>Oscar</a:t>
-            </a:r>
-            <a:endParaRPr lang="es-CO" dirty="0"/>
-          </a:p>
-        </p:txBody>
-      </p:sp>
-      <p:sp>
-        <p:nvSpPr>
-          <p:cNvPr id="3" name="Marcador de contenido 2">
-            <a:extLst>
-              <a:ext uri="{FF2B5EF4-FFF2-40B4-BE49-F238E27FC236}">
-                <a16:creationId xmlns:a16="http://schemas.microsoft.com/office/drawing/2014/main" id="{094386A6-2D45-4B42-84C8-836F9BBDA414}"/>
-              </a:ext>
-            </a:extLst>
-          </p:cNvPr>
-          <p:cNvSpPr>
-            <a:spLocks noGrp="1"/>
-          </p:cNvSpPr>
-          <p:nvPr>
-            <p:ph idx="1"/>
-          </p:nvPr>
-        </p:nvSpPr>
-        <p:spPr/>
-        <p:txBody>
-          <a:bodyPr/>
-          <a:lstStyle/>
-          <a:p>
-            <a:endParaRPr lang="es-CO"/>
-          </a:p>
-        </p:txBody>
-      </p:sp>
-    </p:spTree>
-    <p:extLst>
-      <p:ext uri="{BB962C8B-B14F-4D97-AF65-F5344CB8AC3E}">
-        <p14:creationId xmlns:p14="http://schemas.microsoft.com/office/powerpoint/2010/main" val="910729627"/>
-      </p:ext>
-    </p:extLst>
-  </p:cSld>
-  <p:clrMapOvr>
-    <a:masterClrMapping/>
-  </p:clrMapOvr>
-  <mc:AlternateContent xmlns:mc="http://schemas.openxmlformats.org/markup-compatibility/2006" xmlns:p14="http://schemas.microsoft.com/office/powerpoint/2010/main">
-    <mc:Choice Requires="p14">
-      <p:transition p14:dur="10" advClick="0" advTm="5400000"/>
-    </mc:Choice>
-    <mc:Fallback xmlns="">
-      <p:transition advClick="0" advTm="5400000"/>
-    </mc:Fallback>
-  </mc:AlternateContent>
-</p:sld>
-</file>
-
-<file path=ppt/slides/slide15.xml><?xml version="1.0" encoding="utf-8"?>
-<p:sld xmlns:a="http://schemas.openxmlformats.org/drawingml/2006/main" xmlns:r="http://schemas.openxmlformats.org/officeDocument/2006/relationships" xmlns:p="http://schemas.openxmlformats.org/presentationml/2006/main">
-  <p:cSld>
-    <p:spTree>
-      <p:nvGrpSpPr>
-        <p:cNvPr id="1" name=""/>
-        <p:cNvGrpSpPr/>
-        <p:nvPr/>
-      </p:nvGrpSpPr>
-      <p:grpSpPr>
-        <a:xfrm>
-          <a:off x="0" y="0"/>
-          <a:ext cx="0" cy="0"/>
-          <a:chOff x="0" y="0"/>
-          <a:chExt cx="0" cy="0"/>
-        </a:xfrm>
-      </p:grpSpPr>
-      <p:sp>
-        <p:nvSpPr>
-          <p:cNvPr id="2" name="Título 1">
-            <a:extLst>
-              <a:ext uri="{FF2B5EF4-FFF2-40B4-BE49-F238E27FC236}">
-                <a16:creationId xmlns:a16="http://schemas.microsoft.com/office/drawing/2014/main" id="{3F6C0E19-FE85-47E3-A4F3-57D359B6DACC}"/>
-              </a:ext>
-            </a:extLst>
-          </p:cNvPr>
-          <p:cNvSpPr>
-            <a:spLocks noGrp="1"/>
-          </p:cNvSpPr>
-          <p:nvPr>
-            <p:ph type="title"/>
-          </p:nvPr>
-        </p:nvSpPr>
-        <p:spPr/>
-        <p:txBody>
-          <a:bodyPr/>
-          <a:lstStyle/>
-          <a:p>
-            <a:r>
-              <a:rPr lang="es-MX" dirty="0"/>
-              <a:t>3. Autenticación sin contraseña (</a:t>
-            </a:r>
-            <a:r>
-              <a:rPr lang="es-MX" dirty="0" err="1"/>
-              <a:t>Passwordless</a:t>
-            </a:r>
-            <a:r>
-              <a:rPr lang="es-MX" dirty="0"/>
-              <a:t> </a:t>
-            </a:r>
-            <a:r>
-              <a:rPr lang="es-MX" dirty="0" err="1"/>
-              <a:t>Authentication</a:t>
-            </a:r>
-            <a:r>
-              <a:rPr lang="es-MX" dirty="0"/>
-              <a:t>)</a:t>
-            </a:r>
-            <a:endParaRPr lang="es-CO" dirty="0"/>
-          </a:p>
-        </p:txBody>
-      </p:sp>
-      <p:sp>
-        <p:nvSpPr>
-          <p:cNvPr id="3" name="Marcador de contenido 2">
-            <a:extLst>
-              <a:ext uri="{FF2B5EF4-FFF2-40B4-BE49-F238E27FC236}">
-                <a16:creationId xmlns:a16="http://schemas.microsoft.com/office/drawing/2014/main" id="{9B737E46-58B6-4F22-A80A-71241E96733A}"/>
-              </a:ext>
-            </a:extLst>
-          </p:cNvPr>
-          <p:cNvSpPr>
-            <a:spLocks noGrp="1"/>
-          </p:cNvSpPr>
-          <p:nvPr>
-            <p:ph idx="1"/>
-          </p:nvPr>
-        </p:nvSpPr>
-        <p:spPr/>
-        <p:txBody>
-          <a:bodyPr/>
-          <a:lstStyle/>
-          <a:p>
-            <a:endParaRPr lang="es-CO"/>
-          </a:p>
-        </p:txBody>
-      </p:sp>
-    </p:spTree>
-    <p:extLst>
-      <p:ext uri="{BB962C8B-B14F-4D97-AF65-F5344CB8AC3E}">
-        <p14:creationId xmlns:p14="http://schemas.microsoft.com/office/powerpoint/2010/main" val="2787419759"/>
-      </p:ext>
-    </p:extLst>
-  </p:cSld>
-  <p:clrMapOvr>
-    <a:masterClrMapping/>
-  </p:clrMapOvr>
-  <mc:AlternateContent xmlns:mc="http://schemas.openxmlformats.org/markup-compatibility/2006" xmlns:p14="http://schemas.microsoft.com/office/powerpoint/2010/main">
-    <mc:Choice Requires="p14">
-      <p:transition p14:dur="10" advClick="0" advTm="5400000"/>
-    </mc:Choice>
-    <mc:Fallback xmlns="">
-      <p:transition advClick="0" advTm="5400000"/>
-    </mc:Fallback>
-  </mc:AlternateContent>
-</p:sld>
-</file>
-
 <file path=ppt/slides/slide16.xml><?xml version="1.0" encoding="utf-8"?>
 <p:sld xmlns:a="http://schemas.openxmlformats.org/drawingml/2006/main" xmlns:r="http://schemas.openxmlformats.org/officeDocument/2006/relationships" xmlns:p="http://schemas.openxmlformats.org/presentationml/2006/main">
   <p:cSld>
@@ -8198,7 +8188,7 @@
           <p:cNvPr id="2" name="Título 1">
             <a:extLst>
               <a:ext uri="{FF2B5EF4-FFF2-40B4-BE49-F238E27FC236}">
-                <a16:creationId xmlns:a16="http://schemas.microsoft.com/office/drawing/2014/main" id="{76D5CDF9-F150-44D5-AB46-78F0F5C348AC}"/>
+                <a16:creationId xmlns:a16="http://schemas.microsoft.com/office/drawing/2014/main" id="{EDC3F24B-364C-4C44-82C5-2C13CE3059A0}"/>
               </a:ext>
             </a:extLst>
           </p:cNvPr>
@@ -8216,15 +8206,7 @@
           <a:p>
             <a:r>
               <a:rPr lang="es-MX" dirty="0"/>
-              <a:t>4. Autenticación </a:t>
-            </a:r>
-            <a:r>
-              <a:rPr lang="es-MX" dirty="0" err="1"/>
-              <a:t>multifactor</a:t>
-            </a:r>
-            <a:r>
-              <a:rPr lang="es-MX" dirty="0"/>
-              <a:t> (MFA) mejorada con IA</a:t>
+              <a:t>Oscar</a:t>
             </a:r>
             <a:endParaRPr lang="es-CO" dirty="0"/>
           </a:p>
@@ -8235,7 +8217,7 @@
           <p:cNvPr id="3" name="Marcador de contenido 2">
             <a:extLst>
               <a:ext uri="{FF2B5EF4-FFF2-40B4-BE49-F238E27FC236}">
-                <a16:creationId xmlns:a16="http://schemas.microsoft.com/office/drawing/2014/main" id="{BCFA120E-5CBF-4B20-B891-69A81CC2061C}"/>
+                <a16:creationId xmlns:a16="http://schemas.microsoft.com/office/drawing/2014/main" id="{094386A6-2D45-4B42-84C8-836F9BBDA414}"/>
               </a:ext>
             </a:extLst>
           </p:cNvPr>
@@ -8258,7 +8240,7 @@
     </p:spTree>
     <p:extLst>
       <p:ext uri="{BB962C8B-B14F-4D97-AF65-F5344CB8AC3E}">
-        <p14:creationId xmlns:p14="http://schemas.microsoft.com/office/powerpoint/2010/main" val="1631633433"/>
+        <p14:creationId xmlns:p14="http://schemas.microsoft.com/office/powerpoint/2010/main" val="910729627"/>
       </p:ext>
     </p:extLst>
   </p:cSld>
@@ -8298,7 +8280,7 @@
           <p:cNvPr id="2" name="Título 1">
             <a:extLst>
               <a:ext uri="{FF2B5EF4-FFF2-40B4-BE49-F238E27FC236}">
-                <a16:creationId xmlns:a16="http://schemas.microsoft.com/office/drawing/2014/main" id="{99E569F5-7491-44A0-AE96-19B11C7CECAA}"/>
+                <a16:creationId xmlns:a16="http://schemas.microsoft.com/office/drawing/2014/main" id="{3F6C0E19-FE85-47E3-A4F3-57D359B6DACC}"/>
               </a:ext>
             </a:extLst>
           </p:cNvPr>
@@ -8315,12 +8297,24 @@
           <a:lstStyle/>
           <a:p>
             <a:r>
-              <a:rPr lang="es-CO" dirty="0"/>
-              <a:t>Andrés </a:t>
-            </a:r>
-            <a:r>
-              <a:rPr lang="es-CO" dirty="0" err="1"/>
-              <a:t>Berdugo</a:t>
+              <a:rPr lang="es-MX" dirty="0"/>
+              <a:t>3. Autenticación sin contraseña (</a:t>
+            </a:r>
+            <a:r>
+              <a:rPr lang="es-MX" dirty="0" err="1"/>
+              <a:t>Passwordless</a:t>
+            </a:r>
+            <a:r>
+              <a:rPr lang="es-MX" dirty="0"/>
+              <a:t> </a:t>
+            </a:r>
+            <a:r>
+              <a:rPr lang="es-MX" dirty="0" err="1"/>
+              <a:t>Authentication</a:t>
+            </a:r>
+            <a:r>
+              <a:rPr lang="es-MX" dirty="0"/>
+              <a:t>)</a:t>
             </a:r>
             <a:endParaRPr lang="es-CO" dirty="0"/>
           </a:p>
@@ -8331,7 +8325,7 @@
           <p:cNvPr id="3" name="Marcador de contenido 2">
             <a:extLst>
               <a:ext uri="{FF2B5EF4-FFF2-40B4-BE49-F238E27FC236}">
-                <a16:creationId xmlns:a16="http://schemas.microsoft.com/office/drawing/2014/main" id="{42582AD2-309F-409B-BFA0-A6BBABF3F1FD}"/>
+                <a16:creationId xmlns:a16="http://schemas.microsoft.com/office/drawing/2014/main" id="{9B737E46-58B6-4F22-A80A-71241E96733A}"/>
               </a:ext>
             </a:extLst>
           </p:cNvPr>
@@ -8354,7 +8348,7 @@
     </p:spTree>
     <p:extLst>
       <p:ext uri="{BB962C8B-B14F-4D97-AF65-F5344CB8AC3E}">
-        <p14:creationId xmlns:p14="http://schemas.microsoft.com/office/powerpoint/2010/main" val="1053201561"/>
+        <p14:creationId xmlns:p14="http://schemas.microsoft.com/office/powerpoint/2010/main" val="2787419759"/>
       </p:ext>
     </p:extLst>
   </p:cSld>
@@ -8394,7 +8388,7 @@
           <p:cNvPr id="2" name="Título 1">
             <a:extLst>
               <a:ext uri="{FF2B5EF4-FFF2-40B4-BE49-F238E27FC236}">
-                <a16:creationId xmlns:a16="http://schemas.microsoft.com/office/drawing/2014/main" id="{D18B5F6A-F3C0-4585-BB00-74D7826DA468}"/>
+                <a16:creationId xmlns:a16="http://schemas.microsoft.com/office/drawing/2014/main" id="{76D5CDF9-F150-44D5-AB46-78F0F5C348AC}"/>
               </a:ext>
             </a:extLst>
           </p:cNvPr>
@@ -8407,14 +8401,20 @@
         </p:nvSpPr>
         <p:spPr/>
         <p:txBody>
-          <a:bodyPr>
-            <a:normAutofit/>
-          </a:bodyPr>
+          <a:bodyPr/>
           <a:lstStyle/>
           <a:p>
             <a:r>
               <a:rPr lang="es-MX" dirty="0"/>
-              <a:t>5.	Identidad Digital Federada</a:t>
+              <a:t>4. Autenticación </a:t>
+            </a:r>
+            <a:r>
+              <a:rPr lang="es-MX" dirty="0" err="1"/>
+              <a:t>multifactor</a:t>
+            </a:r>
+            <a:r>
+              <a:rPr lang="es-MX" dirty="0"/>
+              <a:t> (MFA) mejorada con IA</a:t>
             </a:r>
             <a:endParaRPr lang="es-CO" dirty="0"/>
           </a:p>
@@ -8425,7 +8425,7 @@
           <p:cNvPr id="3" name="Marcador de contenido 2">
             <a:extLst>
               <a:ext uri="{FF2B5EF4-FFF2-40B4-BE49-F238E27FC236}">
-                <a16:creationId xmlns:a16="http://schemas.microsoft.com/office/drawing/2014/main" id="{70B49BBE-0DFB-4914-A250-5D7564E2EBE0}"/>
+                <a16:creationId xmlns:a16="http://schemas.microsoft.com/office/drawing/2014/main" id="{BCFA120E-5CBF-4B20-B891-69A81CC2061C}"/>
               </a:ext>
             </a:extLst>
           </p:cNvPr>
@@ -8448,7 +8448,7 @@
     </p:spTree>
     <p:extLst>
       <p:ext uri="{BB962C8B-B14F-4D97-AF65-F5344CB8AC3E}">
-        <p14:creationId xmlns:p14="http://schemas.microsoft.com/office/powerpoint/2010/main" val="2636334350"/>
+        <p14:creationId xmlns:p14="http://schemas.microsoft.com/office/powerpoint/2010/main" val="1631633433"/>
       </p:ext>
     </p:extLst>
   </p:cSld>
@@ -8488,7 +8488,7 @@
           <p:cNvPr id="2" name="Título 1">
             <a:extLst>
               <a:ext uri="{FF2B5EF4-FFF2-40B4-BE49-F238E27FC236}">
-                <a16:creationId xmlns:a16="http://schemas.microsoft.com/office/drawing/2014/main" id="{D3F22A96-46D9-4EB8-88F3-7E4ED79F3A34}"/>
+                <a16:creationId xmlns:a16="http://schemas.microsoft.com/office/drawing/2014/main" id="{99E569F5-7491-44A0-AE96-19B11C7CECAA}"/>
               </a:ext>
             </a:extLst>
           </p:cNvPr>
@@ -8505,16 +8505,12 @@
           <a:lstStyle/>
           <a:p>
             <a:r>
-              <a:rPr lang="es-MX" dirty="0"/>
-              <a:t>6.	Identidad Digital para el Internet de las Cosas (</a:t>
-            </a:r>
-            <a:r>
-              <a:rPr lang="es-MX" dirty="0" err="1"/>
-              <a:t>IoT</a:t>
-            </a:r>
-            <a:r>
-              <a:rPr lang="es-MX" dirty="0"/>
-              <a:t>)</a:t>
+              <a:rPr lang="es-CO" dirty="0"/>
+              <a:t>Andrés </a:t>
+            </a:r>
+            <a:r>
+              <a:rPr lang="es-CO" dirty="0" err="1"/>
+              <a:t>Berdugo</a:t>
             </a:r>
             <a:endParaRPr lang="es-CO" dirty="0"/>
           </a:p>
@@ -8525,7 +8521,7 @@
           <p:cNvPr id="3" name="Marcador de contenido 2">
             <a:extLst>
               <a:ext uri="{FF2B5EF4-FFF2-40B4-BE49-F238E27FC236}">
-                <a16:creationId xmlns:a16="http://schemas.microsoft.com/office/drawing/2014/main" id="{6D54B4EB-7A49-43F4-B865-65E058C81D6C}"/>
+                <a16:creationId xmlns:a16="http://schemas.microsoft.com/office/drawing/2014/main" id="{42582AD2-309F-409B-BFA0-A6BBABF3F1FD}"/>
               </a:ext>
             </a:extLst>
           </p:cNvPr>
@@ -8548,7 +8544,7 @@
     </p:spTree>
     <p:extLst>
       <p:ext uri="{BB962C8B-B14F-4D97-AF65-F5344CB8AC3E}">
-        <p14:creationId xmlns:p14="http://schemas.microsoft.com/office/powerpoint/2010/main" val="1835682298"/>
+        <p14:creationId xmlns:p14="http://schemas.microsoft.com/office/powerpoint/2010/main" val="1053201561"/>
       </p:ext>
     </p:extLst>
   </p:cSld>
@@ -8583,32 +8579,188 @@
           <a:chExt cx="0" cy="0"/>
         </a:xfrm>
       </p:grpSpPr>
-      <p:sp>
-        <p:nvSpPr>
-          <p:cNvPr id="2" name="Título 1">
-            <a:extLst>
-              <a:ext uri="{FF2B5EF4-FFF2-40B4-BE49-F238E27FC236}">
-                <a16:creationId xmlns:a16="http://schemas.microsoft.com/office/drawing/2014/main" id="{AC374E6B-9E5B-4001-875F-63578C431AC7}"/>
-              </a:ext>
-            </a:extLst>
-          </p:cNvPr>
-          <p:cNvSpPr>
-            <a:spLocks noGrp="1"/>
-          </p:cNvSpPr>
-          <p:nvPr>
-            <p:ph type="ctrTitle"/>
-          </p:nvPr>
-        </p:nvSpPr>
-        <p:spPr/>
-        <p:txBody>
-          <a:bodyPr>
-            <a:normAutofit/>
+      <p:pic>
+        <p:nvPicPr>
+          <p:cNvPr id="1026" name="Picture 2" descr="La Identidad Digital Web3 en una Sociedad Descentralizada (SBTs) - Juan  Merodio">
+            <a:extLst>
+              <a:ext uri="{FF2B5EF4-FFF2-40B4-BE49-F238E27FC236}">
+                <a16:creationId xmlns:a16="http://schemas.microsoft.com/office/drawing/2014/main" id="{9F1140A1-9705-4605-A852-D4D2421C25A0}"/>
+              </a:ext>
+            </a:extLst>
+          </p:cNvPr>
+          <p:cNvPicPr>
+            <a:picLocks noChangeAspect="1" noChangeArrowheads="1"/>
+          </p:cNvPicPr>
+          <p:nvPr/>
+        </p:nvPicPr>
+        <p:blipFill>
+          <a:blip r:embed="rId2">
+            <a:extLst>
+              <a:ext uri="{28A0092B-C50C-407E-A947-70E740481C1C}">
+                <a14:useLocalDpi xmlns:a14="http://schemas.microsoft.com/office/drawing/2010/main" val="0"/>
+              </a:ext>
+            </a:extLst>
+          </a:blip>
+          <a:srcRect/>
+          <a:stretch>
+            <a:fillRect/>
+          </a:stretch>
+        </p:blipFill>
+        <p:spPr bwMode="auto">
+          <a:xfrm>
+            <a:off x="-914400" y="0"/>
+            <a:ext cx="13106400" cy="6858000"/>
+          </a:xfrm>
+          <a:prstGeom prst="rect">
+            <a:avLst/>
+          </a:prstGeom>
+          <a:noFill/>
+          <a:extLst>
+            <a:ext uri="{909E8E84-426E-40DD-AFC4-6F175D3DCCD1}">
+              <a14:hiddenFill xmlns:a14="http://schemas.microsoft.com/office/drawing/2010/main">
+                <a:solidFill>
+                  <a:srgbClr val="FFFFFF"/>
+                </a:solidFill>
+              </a14:hiddenFill>
+            </a:ext>
+          </a:extLst>
+        </p:spPr>
+      </p:pic>
+      <p:sp>
+        <p:nvSpPr>
+          <p:cNvPr id="6" name="CuadroTexto 5">
+            <a:extLst>
+              <a:ext uri="{FF2B5EF4-FFF2-40B4-BE49-F238E27FC236}">
+                <a16:creationId xmlns:a16="http://schemas.microsoft.com/office/drawing/2014/main" id="{8BE63573-B47C-4BFE-B2C3-BC8ACBE94EF3}"/>
+              </a:ext>
+            </a:extLst>
+          </p:cNvPr>
+          <p:cNvSpPr txBox="1"/>
+          <p:nvPr/>
+        </p:nvSpPr>
+        <p:spPr>
+          <a:xfrm>
+            <a:off x="8048625" y="228600"/>
+            <a:ext cx="3619500" cy="1107996"/>
+          </a:xfrm>
+          <a:prstGeom prst="rect">
+            <a:avLst/>
+          </a:prstGeom>
+          <a:noFill/>
+        </p:spPr>
+        <p:txBody>
+          <a:bodyPr wrap="square" rtlCol="0">
+            <a:spAutoFit/>
           </a:bodyPr>
           <a:lstStyle/>
           <a:p>
-            <a:r>
-              <a:rPr lang="es-MX" dirty="0"/>
-              <a:t>Andrés Camilo</a:t>
+            <a:pPr algn="ctr"/>
+            <a:r>
+              <a:rPr lang="es-ES" sz="6600" b="1" dirty="0">
+                <a:solidFill>
+                  <a:schemeClr val="bg1"/>
+                </a:solidFill>
+              </a:rPr>
+              <a:t>¿Qué es?</a:t>
+            </a:r>
+            <a:endParaRPr lang="es-CO" sz="6600" b="1" dirty="0">
+              <a:solidFill>
+                <a:schemeClr val="bg1"/>
+              </a:solidFill>
+            </a:endParaRPr>
+          </a:p>
+        </p:txBody>
+      </p:sp>
+      <p:sp>
+        <p:nvSpPr>
+          <p:cNvPr id="7" name="CuadroTexto 6">
+            <a:extLst>
+              <a:ext uri="{FF2B5EF4-FFF2-40B4-BE49-F238E27FC236}">
+                <a16:creationId xmlns:a16="http://schemas.microsoft.com/office/drawing/2014/main" id="{E30DB31E-E67B-4530-93F1-837AF8F9EAA3}"/>
+              </a:ext>
+            </a:extLst>
+          </p:cNvPr>
+          <p:cNvSpPr txBox="1"/>
+          <p:nvPr/>
+        </p:nvSpPr>
+        <p:spPr>
+          <a:xfrm>
+            <a:off x="5000625" y="1392109"/>
+            <a:ext cx="6572250" cy="830997"/>
+          </a:xfrm>
+          <a:prstGeom prst="rect">
+            <a:avLst/>
+          </a:prstGeom>
+          <a:noFill/>
+        </p:spPr>
+        <p:txBody>
+          <a:bodyPr wrap="square" rtlCol="0">
+            <a:spAutoFit/>
+          </a:bodyPr>
+          <a:lstStyle/>
+          <a:p>
+            <a:pPr algn="just"/>
+            <a:r>
+              <a:rPr lang="es-ES" sz="2400" dirty="0">
+                <a:solidFill>
+                  <a:schemeClr val="bg1"/>
+                </a:solidFill>
+              </a:rPr>
+              <a:t>Se refiere a la representación electrónica de una persona, entidad o cosa en el entorno digital.</a:t>
+            </a:r>
+            <a:endParaRPr lang="es-CO" sz="2400" dirty="0">
+              <a:solidFill>
+                <a:schemeClr val="bg1"/>
+              </a:solidFill>
+            </a:endParaRPr>
+          </a:p>
+        </p:txBody>
+      </p:sp>
+      <p:sp>
+        <p:nvSpPr>
+          <p:cNvPr id="8" name="CuadroTexto 7">
+            <a:extLst>
+              <a:ext uri="{FF2B5EF4-FFF2-40B4-BE49-F238E27FC236}">
+                <a16:creationId xmlns:a16="http://schemas.microsoft.com/office/drawing/2014/main" id="{9841AE1C-89D4-41BA-A9EB-340FFA46AA3B}"/>
+              </a:ext>
+            </a:extLst>
+          </p:cNvPr>
+          <p:cNvSpPr txBox="1"/>
+          <p:nvPr/>
+        </p:nvSpPr>
+        <p:spPr>
+          <a:xfrm>
+            <a:off x="8905875" y="4088800"/>
+            <a:ext cx="2933700" cy="369332"/>
+          </a:xfrm>
+          <a:prstGeom prst="rect">
+            <a:avLst/>
+          </a:prstGeom>
+        </p:spPr>
+        <p:style>
+          <a:lnRef idx="0">
+            <a:schemeClr val="accent4"/>
+          </a:lnRef>
+          <a:fillRef idx="3">
+            <a:schemeClr val="accent4"/>
+          </a:fillRef>
+          <a:effectRef idx="3">
+            <a:schemeClr val="accent4"/>
+          </a:effectRef>
+          <a:fontRef idx="minor">
+            <a:schemeClr val="lt1"/>
+          </a:fontRef>
+        </p:style>
+        <p:txBody>
+          <a:bodyPr wrap="square" rtlCol="0">
+            <a:spAutoFit/>
+          </a:bodyPr>
+          <a:lstStyle/>
+          <a:p>
+            <a:pPr algn="ctr"/>
+            <a:r>
+              <a:rPr lang="es-ES" dirty="0"/>
+              <a:t>Información personal</a:t>
             </a:r>
             <a:endParaRPr lang="es-CO" dirty="0"/>
           </a:p>
@@ -8616,33 +8768,581 @@
       </p:sp>
       <p:sp>
         <p:nvSpPr>
-          <p:cNvPr id="3" name="Subtítulo 2">
-            <a:extLst>
-              <a:ext uri="{FF2B5EF4-FFF2-40B4-BE49-F238E27FC236}">
-                <a16:creationId xmlns:a16="http://schemas.microsoft.com/office/drawing/2014/main" id="{011DA0AB-AD76-4F94-AAA6-82C7D77F1508}"/>
-              </a:ext>
-            </a:extLst>
-          </p:cNvPr>
-          <p:cNvSpPr>
-            <a:spLocks noGrp="1"/>
-          </p:cNvSpPr>
-          <p:nvPr>
-            <p:ph type="subTitle" idx="1"/>
-          </p:nvPr>
-        </p:nvSpPr>
-        <p:spPr/>
-        <p:txBody>
-          <a:bodyPr/>
+          <p:cNvPr id="10" name="CuadroTexto 9">
+            <a:extLst>
+              <a:ext uri="{FF2B5EF4-FFF2-40B4-BE49-F238E27FC236}">
+                <a16:creationId xmlns:a16="http://schemas.microsoft.com/office/drawing/2014/main" id="{E063B991-68AE-4DA3-88D6-0571572D0E63}"/>
+              </a:ext>
+            </a:extLst>
+          </p:cNvPr>
+          <p:cNvSpPr txBox="1"/>
+          <p:nvPr/>
+        </p:nvSpPr>
+        <p:spPr>
+          <a:xfrm>
+            <a:off x="5181600" y="6156602"/>
+            <a:ext cx="2933700" cy="369332"/>
+          </a:xfrm>
+          <a:prstGeom prst="rect">
+            <a:avLst/>
+          </a:prstGeom>
+        </p:spPr>
+        <p:style>
+          <a:lnRef idx="0">
+            <a:schemeClr val="accent4"/>
+          </a:lnRef>
+          <a:fillRef idx="3">
+            <a:schemeClr val="accent4"/>
+          </a:fillRef>
+          <a:effectRef idx="3">
+            <a:schemeClr val="accent4"/>
+          </a:effectRef>
+          <a:fontRef idx="minor">
+            <a:schemeClr val="lt1"/>
+          </a:fontRef>
+        </p:style>
+        <p:txBody>
+          <a:bodyPr wrap="square" rtlCol="0">
+            <a:spAutoFit/>
+          </a:bodyPr>
           <a:lstStyle/>
           <a:p>
-            <a:endParaRPr lang="es-CO"/>
-          </a:p>
-        </p:txBody>
-      </p:sp>
+            <a:pPr algn="ctr"/>
+            <a:r>
+              <a:rPr lang="es-ES" dirty="0"/>
+              <a:t>Datos de autenticación</a:t>
+            </a:r>
+            <a:endParaRPr lang="es-CO" dirty="0"/>
+          </a:p>
+        </p:txBody>
+      </p:sp>
+      <p:sp>
+        <p:nvSpPr>
+          <p:cNvPr id="11" name="CuadroTexto 10">
+            <a:extLst>
+              <a:ext uri="{FF2B5EF4-FFF2-40B4-BE49-F238E27FC236}">
+                <a16:creationId xmlns:a16="http://schemas.microsoft.com/office/drawing/2014/main" id="{AA4877FF-34E0-4D34-8DC0-32667C1AD4B4}"/>
+              </a:ext>
+            </a:extLst>
+          </p:cNvPr>
+          <p:cNvSpPr txBox="1"/>
+          <p:nvPr/>
+        </p:nvSpPr>
+        <p:spPr>
+          <a:xfrm>
+            <a:off x="5200650" y="5455205"/>
+            <a:ext cx="2933700" cy="369332"/>
+          </a:xfrm>
+          <a:prstGeom prst="rect">
+            <a:avLst/>
+          </a:prstGeom>
+        </p:spPr>
+        <p:style>
+          <a:lnRef idx="0">
+            <a:schemeClr val="accent4"/>
+          </a:lnRef>
+          <a:fillRef idx="3">
+            <a:schemeClr val="accent4"/>
+          </a:fillRef>
+          <a:effectRef idx="3">
+            <a:schemeClr val="accent4"/>
+          </a:effectRef>
+          <a:fontRef idx="minor">
+            <a:schemeClr val="lt1"/>
+          </a:fontRef>
+        </p:style>
+        <p:txBody>
+          <a:bodyPr wrap="square" rtlCol="0">
+            <a:spAutoFit/>
+          </a:bodyPr>
+          <a:lstStyle/>
+          <a:p>
+            <a:pPr algn="ctr"/>
+            <a:r>
+              <a:rPr lang="es-ES" dirty="0"/>
+              <a:t>Actividades digitales</a:t>
+            </a:r>
+            <a:endParaRPr lang="es-CO" dirty="0"/>
+          </a:p>
+        </p:txBody>
+      </p:sp>
+      <p:sp>
+        <p:nvSpPr>
+          <p:cNvPr id="12" name="CuadroTexto 11">
+            <a:extLst>
+              <a:ext uri="{FF2B5EF4-FFF2-40B4-BE49-F238E27FC236}">
+                <a16:creationId xmlns:a16="http://schemas.microsoft.com/office/drawing/2014/main" id="{FF92689A-DDDD-4C88-9C80-99D4D36FB8E7}"/>
+              </a:ext>
+            </a:extLst>
+          </p:cNvPr>
+          <p:cNvSpPr txBox="1"/>
+          <p:nvPr/>
+        </p:nvSpPr>
+        <p:spPr>
+          <a:xfrm>
+            <a:off x="5191125" y="4791075"/>
+            <a:ext cx="2933700" cy="369332"/>
+          </a:xfrm>
+          <a:prstGeom prst="rect">
+            <a:avLst/>
+          </a:prstGeom>
+        </p:spPr>
+        <p:style>
+          <a:lnRef idx="0">
+            <a:schemeClr val="accent4"/>
+          </a:lnRef>
+          <a:fillRef idx="3">
+            <a:schemeClr val="accent4"/>
+          </a:fillRef>
+          <a:effectRef idx="3">
+            <a:schemeClr val="accent4"/>
+          </a:effectRef>
+          <a:fontRef idx="minor">
+            <a:schemeClr val="lt1"/>
+          </a:fontRef>
+        </p:style>
+        <p:txBody>
+          <a:bodyPr wrap="square" rtlCol="0">
+            <a:spAutoFit/>
+          </a:bodyPr>
+          <a:lstStyle/>
+          <a:p>
+            <a:pPr algn="ctr"/>
+            <a:r>
+              <a:rPr lang="es-ES" dirty="0"/>
+              <a:t>Registros</a:t>
+            </a:r>
+            <a:endParaRPr lang="es-CO" dirty="0"/>
+          </a:p>
+        </p:txBody>
+      </p:sp>
+      <p:sp>
+        <p:nvSpPr>
+          <p:cNvPr id="15" name="CuadroTexto 14">
+            <a:extLst>
+              <a:ext uri="{FF2B5EF4-FFF2-40B4-BE49-F238E27FC236}">
+                <a16:creationId xmlns:a16="http://schemas.microsoft.com/office/drawing/2014/main" id="{5F573346-E5D5-4040-9024-07FB1538CBB1}"/>
+              </a:ext>
+            </a:extLst>
+          </p:cNvPr>
+          <p:cNvSpPr txBox="1"/>
+          <p:nvPr/>
+        </p:nvSpPr>
+        <p:spPr>
+          <a:xfrm>
+            <a:off x="8905875" y="4772441"/>
+            <a:ext cx="2933700" cy="369332"/>
+          </a:xfrm>
+          <a:prstGeom prst="rect">
+            <a:avLst/>
+          </a:prstGeom>
+        </p:spPr>
+        <p:style>
+          <a:lnRef idx="0">
+            <a:schemeClr val="accent4"/>
+          </a:lnRef>
+          <a:fillRef idx="3">
+            <a:schemeClr val="accent4"/>
+          </a:fillRef>
+          <a:effectRef idx="3">
+            <a:schemeClr val="accent4"/>
+          </a:effectRef>
+          <a:fontRef idx="minor">
+            <a:schemeClr val="lt1"/>
+          </a:fontRef>
+        </p:style>
+        <p:txBody>
+          <a:bodyPr wrap="square" rtlCol="0">
+            <a:spAutoFit/>
+          </a:bodyPr>
+          <a:lstStyle/>
+          <a:p>
+            <a:pPr algn="ctr"/>
+            <a:r>
+              <a:rPr lang="es-ES" dirty="0"/>
+              <a:t>Biometría</a:t>
+            </a:r>
+            <a:endParaRPr lang="es-CO" dirty="0"/>
+          </a:p>
+        </p:txBody>
+      </p:sp>
+      <p:sp>
+        <p:nvSpPr>
+          <p:cNvPr id="16" name="CuadroTexto 15">
+            <a:extLst>
+              <a:ext uri="{FF2B5EF4-FFF2-40B4-BE49-F238E27FC236}">
+                <a16:creationId xmlns:a16="http://schemas.microsoft.com/office/drawing/2014/main" id="{02CF0935-4663-465D-8C35-8CDCF9EC9A05}"/>
+              </a:ext>
+            </a:extLst>
+          </p:cNvPr>
+          <p:cNvSpPr txBox="1"/>
+          <p:nvPr/>
+        </p:nvSpPr>
+        <p:spPr>
+          <a:xfrm>
+            <a:off x="8905875" y="5426095"/>
+            <a:ext cx="2933700" cy="369332"/>
+          </a:xfrm>
+          <a:prstGeom prst="rect">
+            <a:avLst/>
+          </a:prstGeom>
+        </p:spPr>
+        <p:style>
+          <a:lnRef idx="0">
+            <a:schemeClr val="accent4"/>
+          </a:lnRef>
+          <a:fillRef idx="3">
+            <a:schemeClr val="accent4"/>
+          </a:fillRef>
+          <a:effectRef idx="3">
+            <a:schemeClr val="accent4"/>
+          </a:effectRef>
+          <a:fontRef idx="minor">
+            <a:schemeClr val="lt1"/>
+          </a:fontRef>
+        </p:style>
+        <p:txBody>
+          <a:bodyPr wrap="square" rtlCol="0">
+            <a:spAutoFit/>
+          </a:bodyPr>
+          <a:lstStyle/>
+          <a:p>
+            <a:pPr algn="ctr"/>
+            <a:r>
+              <a:rPr lang="es-ES" dirty="0"/>
+              <a:t>Certificación digitales</a:t>
+            </a:r>
+            <a:endParaRPr lang="es-CO" dirty="0"/>
+          </a:p>
+        </p:txBody>
+      </p:sp>
+      <p:sp>
+        <p:nvSpPr>
+          <p:cNvPr id="17" name="CuadroTexto 16">
+            <a:extLst>
+              <a:ext uri="{FF2B5EF4-FFF2-40B4-BE49-F238E27FC236}">
+                <a16:creationId xmlns:a16="http://schemas.microsoft.com/office/drawing/2014/main" id="{CDC1FF37-20C3-42EC-8E75-E9D3711696A3}"/>
+              </a:ext>
+            </a:extLst>
+          </p:cNvPr>
+          <p:cNvSpPr txBox="1"/>
+          <p:nvPr/>
+        </p:nvSpPr>
+        <p:spPr>
+          <a:xfrm>
+            <a:off x="8905875" y="6156602"/>
+            <a:ext cx="2933700" cy="369332"/>
+          </a:xfrm>
+          <a:prstGeom prst="rect">
+            <a:avLst/>
+          </a:prstGeom>
+        </p:spPr>
+        <p:style>
+          <a:lnRef idx="0">
+            <a:schemeClr val="accent4"/>
+          </a:lnRef>
+          <a:fillRef idx="3">
+            <a:schemeClr val="accent4"/>
+          </a:fillRef>
+          <a:effectRef idx="3">
+            <a:schemeClr val="accent4"/>
+          </a:effectRef>
+          <a:fontRef idx="minor">
+            <a:schemeClr val="lt1"/>
+          </a:fontRef>
+        </p:style>
+        <p:txBody>
+          <a:bodyPr wrap="square" rtlCol="0">
+            <a:spAutoFit/>
+          </a:bodyPr>
+          <a:lstStyle/>
+          <a:p>
+            <a:pPr algn="ctr"/>
+            <a:r>
+              <a:rPr lang="es-ES" dirty="0"/>
+              <a:t>Redes sociales</a:t>
+            </a:r>
+            <a:endParaRPr lang="es-CO" dirty="0"/>
+          </a:p>
+        </p:txBody>
+      </p:sp>
+      <p:pic>
+        <p:nvPicPr>
+          <p:cNvPr id="18" name="Gráfico 17" descr="Identificación de empleado con relleno sólido">
+            <a:extLst>
+              <a:ext uri="{FF2B5EF4-FFF2-40B4-BE49-F238E27FC236}">
+                <a16:creationId xmlns:a16="http://schemas.microsoft.com/office/drawing/2014/main" id="{32378042-80C8-45C0-87DB-DC4E1141C49A}"/>
+              </a:ext>
+            </a:extLst>
+          </p:cNvPr>
+          <p:cNvPicPr>
+            <a:picLocks noChangeAspect="1"/>
+          </p:cNvPicPr>
+          <p:nvPr/>
+        </p:nvPicPr>
+        <p:blipFill>
+          <a:blip r:embed="rId3">
+            <a:extLst>
+              <a:ext uri="{28A0092B-C50C-407E-A947-70E740481C1C}">
+                <a14:useLocalDpi xmlns:a14="http://schemas.microsoft.com/office/drawing/2010/main" val="0"/>
+              </a:ext>
+              <a:ext uri="{96DAC541-7B7A-43D3-8B79-37D633B846F1}">
+                <asvg:svgBlip xmlns:asvg="http://schemas.microsoft.com/office/drawing/2016/SVG/main" r:embed="rId4"/>
+              </a:ext>
+            </a:extLst>
+          </a:blip>
+          <a:stretch>
+            <a:fillRect/>
+          </a:stretch>
+        </p:blipFill>
+        <p:spPr>
+          <a:xfrm>
+            <a:off x="4419600" y="4634895"/>
+            <a:ext cx="619125" cy="619125"/>
+          </a:xfrm>
+          <a:prstGeom prst="rect">
+            <a:avLst/>
+          </a:prstGeom>
+        </p:spPr>
+      </p:pic>
+      <p:pic>
+        <p:nvPicPr>
+          <p:cNvPr id="20" name="Gráfico 19" descr="Identificación de empleado con relleno sólido">
+            <a:extLst>
+              <a:ext uri="{FF2B5EF4-FFF2-40B4-BE49-F238E27FC236}">
+                <a16:creationId xmlns:a16="http://schemas.microsoft.com/office/drawing/2014/main" id="{4BCA02C2-D32A-40EE-B48D-8F31F2DCA076}"/>
+              </a:ext>
+            </a:extLst>
+          </p:cNvPr>
+          <p:cNvPicPr>
+            <a:picLocks noChangeAspect="1"/>
+          </p:cNvPicPr>
+          <p:nvPr/>
+        </p:nvPicPr>
+        <p:blipFill>
+          <a:blip r:embed="rId3">
+            <a:extLst>
+              <a:ext uri="{28A0092B-C50C-407E-A947-70E740481C1C}">
+                <a14:useLocalDpi xmlns:a14="http://schemas.microsoft.com/office/drawing/2010/main" val="0"/>
+              </a:ext>
+              <a:ext uri="{96DAC541-7B7A-43D3-8B79-37D633B846F1}">
+                <asvg:svgBlip xmlns:asvg="http://schemas.microsoft.com/office/drawing/2016/SVG/main" r:embed="rId4"/>
+              </a:ext>
+            </a:extLst>
+          </a:blip>
+          <a:stretch>
+            <a:fillRect/>
+          </a:stretch>
+        </p:blipFill>
+        <p:spPr>
+          <a:xfrm>
+            <a:off x="8220074" y="3968196"/>
+            <a:ext cx="619125" cy="619125"/>
+          </a:xfrm>
+          <a:prstGeom prst="rect">
+            <a:avLst/>
+          </a:prstGeom>
+        </p:spPr>
+      </p:pic>
+      <p:pic>
+        <p:nvPicPr>
+          <p:cNvPr id="21" name="Gráfico 20" descr="Identificación de empleado con relleno sólido">
+            <a:extLst>
+              <a:ext uri="{FF2B5EF4-FFF2-40B4-BE49-F238E27FC236}">
+                <a16:creationId xmlns:a16="http://schemas.microsoft.com/office/drawing/2014/main" id="{74CB75BD-E1A1-42EF-9163-E1949F76E31B}"/>
+              </a:ext>
+            </a:extLst>
+          </p:cNvPr>
+          <p:cNvPicPr>
+            <a:picLocks noChangeAspect="1"/>
+          </p:cNvPicPr>
+          <p:nvPr/>
+        </p:nvPicPr>
+        <p:blipFill>
+          <a:blip r:embed="rId3">
+            <a:extLst>
+              <a:ext uri="{28A0092B-C50C-407E-A947-70E740481C1C}">
+                <a14:useLocalDpi xmlns:a14="http://schemas.microsoft.com/office/drawing/2010/main" val="0"/>
+              </a:ext>
+              <a:ext uri="{96DAC541-7B7A-43D3-8B79-37D633B846F1}">
+                <asvg:svgBlip xmlns:asvg="http://schemas.microsoft.com/office/drawing/2016/SVG/main" r:embed="rId4"/>
+              </a:ext>
+            </a:extLst>
+          </a:blip>
+          <a:stretch>
+            <a:fillRect/>
+          </a:stretch>
+        </p:blipFill>
+        <p:spPr>
+          <a:xfrm>
+            <a:off x="8205787" y="4647544"/>
+            <a:ext cx="619125" cy="619125"/>
+          </a:xfrm>
+          <a:prstGeom prst="rect">
+            <a:avLst/>
+          </a:prstGeom>
+        </p:spPr>
+      </p:pic>
+      <p:pic>
+        <p:nvPicPr>
+          <p:cNvPr id="22" name="Gráfico 21" descr="Identificación de empleado con relleno sólido">
+            <a:extLst>
+              <a:ext uri="{FF2B5EF4-FFF2-40B4-BE49-F238E27FC236}">
+                <a16:creationId xmlns:a16="http://schemas.microsoft.com/office/drawing/2014/main" id="{2DA41EF5-3C40-484C-B40B-494A94DEF9CC}"/>
+              </a:ext>
+            </a:extLst>
+          </p:cNvPr>
+          <p:cNvPicPr>
+            <a:picLocks noChangeAspect="1"/>
+          </p:cNvPicPr>
+          <p:nvPr/>
+        </p:nvPicPr>
+        <p:blipFill>
+          <a:blip r:embed="rId3">
+            <a:extLst>
+              <a:ext uri="{28A0092B-C50C-407E-A947-70E740481C1C}">
+                <a14:useLocalDpi xmlns:a14="http://schemas.microsoft.com/office/drawing/2010/main" val="0"/>
+              </a:ext>
+              <a:ext uri="{96DAC541-7B7A-43D3-8B79-37D633B846F1}">
+                <asvg:svgBlip xmlns:asvg="http://schemas.microsoft.com/office/drawing/2016/SVG/main" r:embed="rId4"/>
+              </a:ext>
+            </a:extLst>
+          </a:blip>
+          <a:stretch>
+            <a:fillRect/>
+          </a:stretch>
+        </p:blipFill>
+        <p:spPr>
+          <a:xfrm>
+            <a:off x="4438649" y="5300989"/>
+            <a:ext cx="619125" cy="619125"/>
+          </a:xfrm>
+          <a:prstGeom prst="rect">
+            <a:avLst/>
+          </a:prstGeom>
+        </p:spPr>
+      </p:pic>
+      <p:pic>
+        <p:nvPicPr>
+          <p:cNvPr id="23" name="Gráfico 22" descr="Identificación de empleado con relleno sólido">
+            <a:extLst>
+              <a:ext uri="{FF2B5EF4-FFF2-40B4-BE49-F238E27FC236}">
+                <a16:creationId xmlns:a16="http://schemas.microsoft.com/office/drawing/2014/main" id="{6B524AAF-855A-4D32-B62F-73D8E8EA024B}"/>
+              </a:ext>
+            </a:extLst>
+          </p:cNvPr>
+          <p:cNvPicPr>
+            <a:picLocks noChangeAspect="1"/>
+          </p:cNvPicPr>
+          <p:nvPr/>
+        </p:nvPicPr>
+        <p:blipFill>
+          <a:blip r:embed="rId3">
+            <a:extLst>
+              <a:ext uri="{28A0092B-C50C-407E-A947-70E740481C1C}">
+                <a14:useLocalDpi xmlns:a14="http://schemas.microsoft.com/office/drawing/2010/main" val="0"/>
+              </a:ext>
+              <a:ext uri="{96DAC541-7B7A-43D3-8B79-37D633B846F1}">
+                <asvg:svgBlip xmlns:asvg="http://schemas.microsoft.com/office/drawing/2016/SVG/main" r:embed="rId4"/>
+              </a:ext>
+            </a:extLst>
+          </a:blip>
+          <a:stretch>
+            <a:fillRect/>
+          </a:stretch>
+        </p:blipFill>
+        <p:spPr>
+          <a:xfrm>
+            <a:off x="4452937" y="5966147"/>
+            <a:ext cx="619125" cy="619125"/>
+          </a:xfrm>
+          <a:prstGeom prst="rect">
+            <a:avLst/>
+          </a:prstGeom>
+        </p:spPr>
+      </p:pic>
+      <p:pic>
+        <p:nvPicPr>
+          <p:cNvPr id="24" name="Gráfico 23" descr="Identificación de empleado con relleno sólido">
+            <a:extLst>
+              <a:ext uri="{FF2B5EF4-FFF2-40B4-BE49-F238E27FC236}">
+                <a16:creationId xmlns:a16="http://schemas.microsoft.com/office/drawing/2014/main" id="{9FC5B365-A4B1-4D0C-883E-DFBD826DAFBF}"/>
+              </a:ext>
+            </a:extLst>
+          </p:cNvPr>
+          <p:cNvPicPr>
+            <a:picLocks noChangeAspect="1"/>
+          </p:cNvPicPr>
+          <p:nvPr/>
+        </p:nvPicPr>
+        <p:blipFill>
+          <a:blip r:embed="rId3">
+            <a:extLst>
+              <a:ext uri="{28A0092B-C50C-407E-A947-70E740481C1C}">
+                <a14:useLocalDpi xmlns:a14="http://schemas.microsoft.com/office/drawing/2010/main" val="0"/>
+              </a:ext>
+              <a:ext uri="{96DAC541-7B7A-43D3-8B79-37D633B846F1}">
+                <asvg:svgBlip xmlns:asvg="http://schemas.microsoft.com/office/drawing/2016/SVG/main" r:embed="rId4"/>
+              </a:ext>
+            </a:extLst>
+          </a:blip>
+          <a:stretch>
+            <a:fillRect/>
+          </a:stretch>
+        </p:blipFill>
+        <p:spPr>
+          <a:xfrm>
+            <a:off x="8224837" y="5300989"/>
+            <a:ext cx="619125" cy="619125"/>
+          </a:xfrm>
+          <a:prstGeom prst="rect">
+            <a:avLst/>
+          </a:prstGeom>
+        </p:spPr>
+      </p:pic>
+      <p:pic>
+        <p:nvPicPr>
+          <p:cNvPr id="25" name="Gráfico 24" descr="Identificación de empleado con relleno sólido">
+            <a:extLst>
+              <a:ext uri="{FF2B5EF4-FFF2-40B4-BE49-F238E27FC236}">
+                <a16:creationId xmlns:a16="http://schemas.microsoft.com/office/drawing/2014/main" id="{00693B41-102F-4762-8A98-3EBEAD09C152}"/>
+              </a:ext>
+            </a:extLst>
+          </p:cNvPr>
+          <p:cNvPicPr>
+            <a:picLocks noChangeAspect="1"/>
+          </p:cNvPicPr>
+          <p:nvPr/>
+        </p:nvPicPr>
+        <p:blipFill>
+          <a:blip r:embed="rId3">
+            <a:extLst>
+              <a:ext uri="{28A0092B-C50C-407E-A947-70E740481C1C}">
+                <a14:useLocalDpi xmlns:a14="http://schemas.microsoft.com/office/drawing/2010/main" val="0"/>
+              </a:ext>
+              <a:ext uri="{96DAC541-7B7A-43D3-8B79-37D633B846F1}">
+                <asvg:svgBlip xmlns:asvg="http://schemas.microsoft.com/office/drawing/2016/SVG/main" r:embed="rId4"/>
+              </a:ext>
+            </a:extLst>
+          </a:blip>
+          <a:stretch>
+            <a:fillRect/>
+          </a:stretch>
+        </p:blipFill>
+        <p:spPr>
+          <a:xfrm>
+            <a:off x="8229600" y="5987719"/>
+            <a:ext cx="619125" cy="619125"/>
+          </a:xfrm>
+          <a:prstGeom prst="rect">
+            <a:avLst/>
+          </a:prstGeom>
+        </p:spPr>
+      </p:pic>
     </p:spTree>
     <p:extLst>
       <p:ext uri="{BB962C8B-B14F-4D97-AF65-F5344CB8AC3E}">
-        <p14:creationId xmlns:p14="http://schemas.microsoft.com/office/powerpoint/2010/main" val="945219257"/>
+        <p14:creationId xmlns:p14="http://schemas.microsoft.com/office/powerpoint/2010/main" val="3164696909"/>
       </p:ext>
     </p:extLst>
   </p:cSld>
@@ -8661,6 +9361,200 @@
 </file>
 
 <file path=ppt/slides/slide20.xml><?xml version="1.0" encoding="utf-8"?>
+<p:sld xmlns:a="http://schemas.openxmlformats.org/drawingml/2006/main" xmlns:r="http://schemas.openxmlformats.org/officeDocument/2006/relationships" xmlns:p="http://schemas.openxmlformats.org/presentationml/2006/main">
+  <p:cSld>
+    <p:spTree>
+      <p:nvGrpSpPr>
+        <p:cNvPr id="1" name=""/>
+        <p:cNvGrpSpPr/>
+        <p:nvPr/>
+      </p:nvGrpSpPr>
+      <p:grpSpPr>
+        <a:xfrm>
+          <a:off x="0" y="0"/>
+          <a:ext cx="0" cy="0"/>
+          <a:chOff x="0" y="0"/>
+          <a:chExt cx="0" cy="0"/>
+        </a:xfrm>
+      </p:grpSpPr>
+      <p:sp>
+        <p:nvSpPr>
+          <p:cNvPr id="2" name="Título 1">
+            <a:extLst>
+              <a:ext uri="{FF2B5EF4-FFF2-40B4-BE49-F238E27FC236}">
+                <a16:creationId xmlns:a16="http://schemas.microsoft.com/office/drawing/2014/main" id="{D18B5F6A-F3C0-4585-BB00-74D7826DA468}"/>
+              </a:ext>
+            </a:extLst>
+          </p:cNvPr>
+          <p:cNvSpPr>
+            <a:spLocks noGrp="1"/>
+          </p:cNvSpPr>
+          <p:nvPr>
+            <p:ph type="title"/>
+          </p:nvPr>
+        </p:nvSpPr>
+        <p:spPr/>
+        <p:txBody>
+          <a:bodyPr>
+            <a:normAutofit/>
+          </a:bodyPr>
+          <a:lstStyle/>
+          <a:p>
+            <a:r>
+              <a:rPr lang="es-MX" dirty="0"/>
+              <a:t>5.	Identidad Digital Federada</a:t>
+            </a:r>
+            <a:endParaRPr lang="es-CO" dirty="0"/>
+          </a:p>
+        </p:txBody>
+      </p:sp>
+      <p:sp>
+        <p:nvSpPr>
+          <p:cNvPr id="3" name="Marcador de contenido 2">
+            <a:extLst>
+              <a:ext uri="{FF2B5EF4-FFF2-40B4-BE49-F238E27FC236}">
+                <a16:creationId xmlns:a16="http://schemas.microsoft.com/office/drawing/2014/main" id="{70B49BBE-0DFB-4914-A250-5D7564E2EBE0}"/>
+              </a:ext>
+            </a:extLst>
+          </p:cNvPr>
+          <p:cNvSpPr>
+            <a:spLocks noGrp="1"/>
+          </p:cNvSpPr>
+          <p:nvPr>
+            <p:ph idx="1"/>
+          </p:nvPr>
+        </p:nvSpPr>
+        <p:spPr/>
+        <p:txBody>
+          <a:bodyPr/>
+          <a:lstStyle/>
+          <a:p>
+            <a:endParaRPr lang="es-CO"/>
+          </a:p>
+        </p:txBody>
+      </p:sp>
+    </p:spTree>
+    <p:extLst>
+      <p:ext uri="{BB962C8B-B14F-4D97-AF65-F5344CB8AC3E}">
+        <p14:creationId xmlns:p14="http://schemas.microsoft.com/office/powerpoint/2010/main" val="2636334350"/>
+      </p:ext>
+    </p:extLst>
+  </p:cSld>
+  <p:clrMapOvr>
+    <a:masterClrMapping/>
+  </p:clrMapOvr>
+  <mc:AlternateContent xmlns:mc="http://schemas.openxmlformats.org/markup-compatibility/2006" xmlns:p14="http://schemas.microsoft.com/office/powerpoint/2010/main">
+    <mc:Choice Requires="p14">
+      <p:transition p14:dur="10" advClick="0" advTm="5400000"/>
+    </mc:Choice>
+    <mc:Fallback xmlns="">
+      <p:transition advClick="0" advTm="5400000"/>
+    </mc:Fallback>
+  </mc:AlternateContent>
+</p:sld>
+</file>
+
+<file path=ppt/slides/slide21.xml><?xml version="1.0" encoding="utf-8"?>
+<p:sld xmlns:a="http://schemas.openxmlformats.org/drawingml/2006/main" xmlns:r="http://schemas.openxmlformats.org/officeDocument/2006/relationships" xmlns:p="http://schemas.openxmlformats.org/presentationml/2006/main">
+  <p:cSld>
+    <p:spTree>
+      <p:nvGrpSpPr>
+        <p:cNvPr id="1" name=""/>
+        <p:cNvGrpSpPr/>
+        <p:nvPr/>
+      </p:nvGrpSpPr>
+      <p:grpSpPr>
+        <a:xfrm>
+          <a:off x="0" y="0"/>
+          <a:ext cx="0" cy="0"/>
+          <a:chOff x="0" y="0"/>
+          <a:chExt cx="0" cy="0"/>
+        </a:xfrm>
+      </p:grpSpPr>
+      <p:sp>
+        <p:nvSpPr>
+          <p:cNvPr id="2" name="Título 1">
+            <a:extLst>
+              <a:ext uri="{FF2B5EF4-FFF2-40B4-BE49-F238E27FC236}">
+                <a16:creationId xmlns:a16="http://schemas.microsoft.com/office/drawing/2014/main" id="{D3F22A96-46D9-4EB8-88F3-7E4ED79F3A34}"/>
+              </a:ext>
+            </a:extLst>
+          </p:cNvPr>
+          <p:cNvSpPr>
+            <a:spLocks noGrp="1"/>
+          </p:cNvSpPr>
+          <p:nvPr>
+            <p:ph type="title"/>
+          </p:nvPr>
+        </p:nvSpPr>
+        <p:spPr/>
+        <p:txBody>
+          <a:bodyPr/>
+          <a:lstStyle/>
+          <a:p>
+            <a:r>
+              <a:rPr lang="es-MX" dirty="0"/>
+              <a:t>6.	Identidad Digital para el Internet de las Cosas (</a:t>
+            </a:r>
+            <a:r>
+              <a:rPr lang="es-MX" dirty="0" err="1"/>
+              <a:t>IoT</a:t>
+            </a:r>
+            <a:r>
+              <a:rPr lang="es-MX" dirty="0"/>
+              <a:t>)</a:t>
+            </a:r>
+            <a:endParaRPr lang="es-CO" dirty="0"/>
+          </a:p>
+        </p:txBody>
+      </p:sp>
+      <p:sp>
+        <p:nvSpPr>
+          <p:cNvPr id="3" name="Marcador de contenido 2">
+            <a:extLst>
+              <a:ext uri="{FF2B5EF4-FFF2-40B4-BE49-F238E27FC236}">
+                <a16:creationId xmlns:a16="http://schemas.microsoft.com/office/drawing/2014/main" id="{6D54B4EB-7A49-43F4-B865-65E058C81D6C}"/>
+              </a:ext>
+            </a:extLst>
+          </p:cNvPr>
+          <p:cNvSpPr>
+            <a:spLocks noGrp="1"/>
+          </p:cNvSpPr>
+          <p:nvPr>
+            <p:ph idx="1"/>
+          </p:nvPr>
+        </p:nvSpPr>
+        <p:spPr/>
+        <p:txBody>
+          <a:bodyPr/>
+          <a:lstStyle/>
+          <a:p>
+            <a:endParaRPr lang="es-CO"/>
+          </a:p>
+        </p:txBody>
+      </p:sp>
+    </p:spTree>
+    <p:extLst>
+      <p:ext uri="{BB962C8B-B14F-4D97-AF65-F5344CB8AC3E}">
+        <p14:creationId xmlns:p14="http://schemas.microsoft.com/office/powerpoint/2010/main" val="1835682298"/>
+      </p:ext>
+    </p:extLst>
+  </p:cSld>
+  <p:clrMapOvr>
+    <a:masterClrMapping/>
+  </p:clrMapOvr>
+  <mc:AlternateContent xmlns:mc="http://schemas.openxmlformats.org/markup-compatibility/2006" xmlns:p14="http://schemas.microsoft.com/office/powerpoint/2010/main">
+    <mc:Choice Requires="p14">
+      <p:transition p14:dur="10" advClick="0" advTm="5400000"/>
+    </mc:Choice>
+    <mc:Fallback xmlns="">
+      <p:transition advClick="0" advTm="5400000"/>
+    </mc:Fallback>
+  </mc:AlternateContent>
+</p:sld>
+</file>
+
+<file path=ppt/slides/slide22.xml><?xml version="1.0" encoding="utf-8"?>
 <p:sld xmlns:a="http://schemas.openxmlformats.org/drawingml/2006/main" xmlns:r="http://schemas.openxmlformats.org/officeDocument/2006/relationships" xmlns:p="http://schemas.openxmlformats.org/presentationml/2006/main">
   <p:cSld>
     <p:spTree>
@@ -8769,67 +9663,626 @@
           <a:chExt cx="0" cy="0"/>
         </a:xfrm>
       </p:grpSpPr>
-      <p:sp>
-        <p:nvSpPr>
-          <p:cNvPr id="2" name="Título 1">
-            <a:extLst>
-              <a:ext uri="{FF2B5EF4-FFF2-40B4-BE49-F238E27FC236}">
-                <a16:creationId xmlns:a16="http://schemas.microsoft.com/office/drawing/2014/main" id="{5B16F082-CFE2-41C8-98CA-8E6376D0D047}"/>
-              </a:ext>
-            </a:extLst>
-          </p:cNvPr>
-          <p:cNvSpPr>
-            <a:spLocks noGrp="1"/>
-          </p:cNvSpPr>
-          <p:nvPr>
-            <p:ph type="title"/>
-          </p:nvPr>
-        </p:nvSpPr>
-        <p:spPr/>
-        <p:txBody>
-          <a:bodyPr/>
+      <p:pic>
+        <p:nvPicPr>
+          <p:cNvPr id="7" name="Imagen 6">
+            <a:extLst>
+              <a:ext uri="{FF2B5EF4-FFF2-40B4-BE49-F238E27FC236}">
+                <a16:creationId xmlns:a16="http://schemas.microsoft.com/office/drawing/2014/main" id="{6B6D0DF7-B6B2-47C4-B02D-A3A0D6510B34}"/>
+              </a:ext>
+            </a:extLst>
+          </p:cNvPr>
+          <p:cNvPicPr>
+            <a:picLocks noChangeAspect="1"/>
+          </p:cNvPicPr>
+          <p:nvPr/>
+        </p:nvPicPr>
+        <p:blipFill>
+          <a:blip r:embed="rId2"/>
+          <a:stretch>
+            <a:fillRect/>
+          </a:stretch>
+        </p:blipFill>
+        <p:spPr>
+          <a:xfrm>
+            <a:off x="0" y="-23813"/>
+            <a:ext cx="12192000" cy="6881813"/>
+          </a:xfrm>
+          <a:prstGeom prst="rect">
+            <a:avLst/>
+          </a:prstGeom>
+        </p:spPr>
+      </p:pic>
+      <p:sp>
+        <p:nvSpPr>
+          <p:cNvPr id="8" name="CuadroTexto 7">
+            <a:extLst>
+              <a:ext uri="{FF2B5EF4-FFF2-40B4-BE49-F238E27FC236}">
+                <a16:creationId xmlns:a16="http://schemas.microsoft.com/office/drawing/2014/main" id="{CFD24312-82C8-468E-8B3A-8E0963D5E9E2}"/>
+              </a:ext>
+            </a:extLst>
+          </p:cNvPr>
+          <p:cNvSpPr txBox="1"/>
+          <p:nvPr/>
+        </p:nvSpPr>
+        <p:spPr>
+          <a:xfrm>
+            <a:off x="123825" y="-23813"/>
+            <a:ext cx="11582400" cy="1107996"/>
+          </a:xfrm>
+          <a:prstGeom prst="rect">
+            <a:avLst/>
+          </a:prstGeom>
+          <a:noFill/>
+        </p:spPr>
+        <p:txBody>
+          <a:bodyPr wrap="square" rtlCol="0">
+            <a:spAutoFit/>
+          </a:bodyPr>
           <a:lstStyle/>
           <a:p>
-            <a:r>
-              <a:rPr lang="es-MX" dirty="0"/>
-              <a:t>1:Evolución de la identidad digital</a:t>
-            </a:r>
-            <a:br>
-              <a:rPr lang="es-MX" dirty="0"/>
-            </a:br>
+            <a:pPr algn="ctr"/>
+            <a:r>
+              <a:rPr lang="es-ES" sz="6600" b="1" dirty="0">
+                <a:solidFill>
+                  <a:schemeClr val="bg1"/>
+                </a:solidFill>
+              </a:rPr>
+              <a:t>Evolución de la identidad digital</a:t>
+            </a:r>
+            <a:endParaRPr lang="es-CO" sz="6600" b="1" dirty="0">
+              <a:solidFill>
+                <a:schemeClr val="bg1"/>
+              </a:solidFill>
+            </a:endParaRPr>
+          </a:p>
+        </p:txBody>
+      </p:sp>
+      <p:sp>
+        <p:nvSpPr>
+          <p:cNvPr id="9" name="CuadroTexto 8">
+            <a:extLst>
+              <a:ext uri="{FF2B5EF4-FFF2-40B4-BE49-F238E27FC236}">
+                <a16:creationId xmlns:a16="http://schemas.microsoft.com/office/drawing/2014/main" id="{994344CB-5E2E-4DF6-BEA9-A85F5A5D0EE4}"/>
+              </a:ext>
+            </a:extLst>
+          </p:cNvPr>
+          <p:cNvSpPr txBox="1"/>
+          <p:nvPr/>
+        </p:nvSpPr>
+        <p:spPr>
+          <a:xfrm>
+            <a:off x="809625" y="1508389"/>
+            <a:ext cx="2933700" cy="369332"/>
+          </a:xfrm>
+          <a:prstGeom prst="rect">
+            <a:avLst/>
+          </a:prstGeom>
+        </p:spPr>
+        <p:style>
+          <a:lnRef idx="2">
+            <a:schemeClr val="dk1">
+              <a:shade val="50000"/>
+            </a:schemeClr>
+          </a:lnRef>
+          <a:fillRef idx="1">
+            <a:schemeClr val="dk1"/>
+          </a:fillRef>
+          <a:effectRef idx="0">
+            <a:schemeClr val="dk1"/>
+          </a:effectRef>
+          <a:fontRef idx="minor">
+            <a:schemeClr val="lt1"/>
+          </a:fontRef>
+        </p:style>
+        <p:txBody>
+          <a:bodyPr wrap="square" rtlCol="0">
+            <a:spAutoFit/>
+          </a:bodyPr>
+          <a:lstStyle/>
+          <a:p>
+            <a:pPr algn="ctr"/>
+            <a:r>
+              <a:rPr lang="es-ES" dirty="0"/>
+              <a:t>Entorno estático</a:t>
+            </a:r>
             <a:endParaRPr lang="es-CO" dirty="0"/>
           </a:p>
         </p:txBody>
       </p:sp>
       <p:sp>
         <p:nvSpPr>
-          <p:cNvPr id="3" name="Marcador de contenido 2">
-            <a:extLst>
-              <a:ext uri="{FF2B5EF4-FFF2-40B4-BE49-F238E27FC236}">
-                <a16:creationId xmlns:a16="http://schemas.microsoft.com/office/drawing/2014/main" id="{44712DC9-686C-444F-8CD8-ACDBDE10001D}"/>
-              </a:ext>
-            </a:extLst>
-          </p:cNvPr>
-          <p:cNvSpPr>
-            <a:spLocks noGrp="1"/>
-          </p:cNvSpPr>
-          <p:nvPr>
-            <p:ph idx="1"/>
-          </p:nvPr>
-        </p:nvSpPr>
-        <p:spPr/>
-        <p:txBody>
-          <a:bodyPr/>
+          <p:cNvPr id="10" name="CuadroTexto 9">
+            <a:extLst>
+              <a:ext uri="{FF2B5EF4-FFF2-40B4-BE49-F238E27FC236}">
+                <a16:creationId xmlns:a16="http://schemas.microsoft.com/office/drawing/2014/main" id="{0BA0FCB8-CF65-4124-89E8-85308EBB2DC2}"/>
+              </a:ext>
+            </a:extLst>
+          </p:cNvPr>
+          <p:cNvSpPr txBox="1"/>
+          <p:nvPr/>
+        </p:nvSpPr>
+        <p:spPr>
+          <a:xfrm>
+            <a:off x="8181975" y="1549986"/>
+            <a:ext cx="2933700" cy="369332"/>
+          </a:xfrm>
+          <a:prstGeom prst="rect">
+            <a:avLst/>
+          </a:prstGeom>
+        </p:spPr>
+        <p:style>
+          <a:lnRef idx="2">
+            <a:schemeClr val="dk1">
+              <a:shade val="50000"/>
+            </a:schemeClr>
+          </a:lnRef>
+          <a:fillRef idx="1">
+            <a:schemeClr val="dk1"/>
+          </a:fillRef>
+          <a:effectRef idx="0">
+            <a:schemeClr val="dk1"/>
+          </a:effectRef>
+          <a:fontRef idx="minor">
+            <a:schemeClr val="lt1"/>
+          </a:fontRef>
+        </p:style>
+        <p:txBody>
+          <a:bodyPr wrap="square" rtlCol="0">
+            <a:spAutoFit/>
+          </a:bodyPr>
           <a:lstStyle/>
           <a:p>
-            <a:endParaRPr lang="es-CO"/>
+            <a:pPr algn="ctr"/>
+            <a:r>
+              <a:rPr lang="es-ES" dirty="0"/>
+              <a:t>Entorno dinámico</a:t>
+            </a:r>
+            <a:endParaRPr lang="es-CO" dirty="0"/>
+          </a:p>
+        </p:txBody>
+      </p:sp>
+      <p:sp>
+        <p:nvSpPr>
+          <p:cNvPr id="11" name="CuadroTexto 10">
+            <a:extLst>
+              <a:ext uri="{FF2B5EF4-FFF2-40B4-BE49-F238E27FC236}">
+                <a16:creationId xmlns:a16="http://schemas.microsoft.com/office/drawing/2014/main" id="{3FC1C46D-75BA-4DE5-A720-7C6212BEAF3B}"/>
+              </a:ext>
+            </a:extLst>
+          </p:cNvPr>
+          <p:cNvSpPr txBox="1"/>
+          <p:nvPr/>
+        </p:nvSpPr>
+        <p:spPr>
+          <a:xfrm>
+            <a:off x="600075" y="2274838"/>
+            <a:ext cx="3352800" cy="2308324"/>
+          </a:xfrm>
+          <a:prstGeom prst="rect">
+            <a:avLst/>
+          </a:prstGeom>
+        </p:spPr>
+        <p:style>
+          <a:lnRef idx="1">
+            <a:schemeClr val="dk1"/>
+          </a:lnRef>
+          <a:fillRef idx="2">
+            <a:schemeClr val="dk1"/>
+          </a:fillRef>
+          <a:effectRef idx="1">
+            <a:schemeClr val="dk1"/>
+          </a:effectRef>
+          <a:fontRef idx="minor">
+            <a:schemeClr val="dk1"/>
+          </a:fontRef>
+        </p:style>
+        <p:txBody>
+          <a:bodyPr wrap="square" rtlCol="0">
+            <a:spAutoFit/>
+          </a:bodyPr>
+          <a:lstStyle/>
+          <a:p>
+            <a:pPr marL="285750" indent="-285750">
+              <a:buFont typeface="Arial" panose="020B0604020202020204" pitchFamily="34" charset="0"/>
+              <a:buChar char="•"/>
+            </a:pPr>
+            <a:r>
+              <a:rPr lang="es-ES" dirty="0">
+                <a:solidFill>
+                  <a:schemeClr val="bg1"/>
+                </a:solidFill>
+              </a:rPr>
+              <a:t>Datos básicos almacenados en servidores centralizados.</a:t>
+            </a:r>
+          </a:p>
+          <a:p>
+            <a:pPr marL="285750" indent="-285750">
+              <a:buFont typeface="Arial" panose="020B0604020202020204" pitchFamily="34" charset="0"/>
+              <a:buChar char="•"/>
+            </a:pPr>
+            <a:r>
+              <a:rPr lang="es-ES" dirty="0">
+                <a:solidFill>
+                  <a:schemeClr val="bg1"/>
+                </a:solidFill>
+              </a:rPr>
+              <a:t>Uso en correos electrónicos y sector financiero.</a:t>
+            </a:r>
+          </a:p>
+          <a:p>
+            <a:pPr marL="285750" indent="-285750">
+              <a:buFont typeface="Arial" panose="020B0604020202020204" pitchFamily="34" charset="0"/>
+              <a:buChar char="•"/>
+            </a:pPr>
+            <a:r>
+              <a:rPr lang="es-CO" dirty="0">
+                <a:solidFill>
+                  <a:schemeClr val="bg1"/>
+                </a:solidFill>
+              </a:rPr>
+              <a:t>Dependiente de terceros.</a:t>
+            </a:r>
+          </a:p>
+          <a:p>
+            <a:pPr marL="285750" indent="-285750">
+              <a:buFont typeface="Arial" panose="020B0604020202020204" pitchFamily="34" charset="0"/>
+              <a:buChar char="•"/>
+            </a:pPr>
+            <a:r>
+              <a:rPr lang="es-CO" dirty="0">
+                <a:solidFill>
+                  <a:schemeClr val="bg1"/>
+                </a:solidFill>
+              </a:rPr>
+              <a:t>Enfoque aislado.</a:t>
+            </a:r>
+          </a:p>
+          <a:p>
+            <a:pPr marL="285750" indent="-285750">
+              <a:buFont typeface="Arial" panose="020B0604020202020204" pitchFamily="34" charset="0"/>
+              <a:buChar char="•"/>
+            </a:pPr>
+            <a:r>
+              <a:rPr lang="es-CO" dirty="0">
+                <a:solidFill>
+                  <a:schemeClr val="bg1"/>
+                </a:solidFill>
+              </a:rPr>
+              <a:t>Verificación manual.</a:t>
+            </a:r>
+          </a:p>
+          <a:p>
+            <a:endParaRPr lang="es-CO" dirty="0">
+              <a:solidFill>
+                <a:schemeClr val="bg1"/>
+              </a:solidFill>
+            </a:endParaRPr>
+          </a:p>
+        </p:txBody>
+      </p:sp>
+      <p:sp>
+        <p:nvSpPr>
+          <p:cNvPr id="12" name="CuadroTexto 11">
+            <a:extLst>
+              <a:ext uri="{FF2B5EF4-FFF2-40B4-BE49-F238E27FC236}">
+                <a16:creationId xmlns:a16="http://schemas.microsoft.com/office/drawing/2014/main" id="{034CE3B3-092C-4DB9-BDA9-777223169CA8}"/>
+              </a:ext>
+            </a:extLst>
+          </p:cNvPr>
+          <p:cNvSpPr txBox="1"/>
+          <p:nvPr/>
+        </p:nvSpPr>
+        <p:spPr>
+          <a:xfrm>
+            <a:off x="8048625" y="2274838"/>
+            <a:ext cx="3352800" cy="3139321"/>
+          </a:xfrm>
+          <a:prstGeom prst="rect">
+            <a:avLst/>
+          </a:prstGeom>
+        </p:spPr>
+        <p:style>
+          <a:lnRef idx="1">
+            <a:schemeClr val="dk1"/>
+          </a:lnRef>
+          <a:fillRef idx="2">
+            <a:schemeClr val="dk1"/>
+          </a:fillRef>
+          <a:effectRef idx="1">
+            <a:schemeClr val="dk1"/>
+          </a:effectRef>
+          <a:fontRef idx="minor">
+            <a:schemeClr val="dk1"/>
+          </a:fontRef>
+        </p:style>
+        <p:txBody>
+          <a:bodyPr wrap="square" rtlCol="0">
+            <a:spAutoFit/>
+          </a:bodyPr>
+          <a:lstStyle/>
+          <a:p>
+            <a:pPr marL="285750" indent="-285750">
+              <a:buFont typeface="Arial" panose="020B0604020202020204" pitchFamily="34" charset="0"/>
+              <a:buChar char="•"/>
+            </a:pPr>
+            <a:r>
+              <a:rPr lang="es-ES" dirty="0">
+                <a:solidFill>
+                  <a:schemeClr val="bg1"/>
+                </a:solidFill>
+              </a:rPr>
+              <a:t>Datos declarados de los usuarios, mas allá de la información básica.</a:t>
+            </a:r>
+          </a:p>
+          <a:p>
+            <a:pPr marL="285750" indent="-285750">
+              <a:buFont typeface="Arial" panose="020B0604020202020204" pitchFamily="34" charset="0"/>
+              <a:buChar char="•"/>
+            </a:pPr>
+            <a:r>
+              <a:rPr lang="es-ES" dirty="0">
+                <a:solidFill>
+                  <a:schemeClr val="bg1"/>
+                </a:solidFill>
+              </a:rPr>
+              <a:t>Comportamiento en la red (historial de búsquedas, compras realizadas, interacciones en redes sociales, entre otros).</a:t>
+            </a:r>
+          </a:p>
+          <a:p>
+            <a:pPr marL="285750" indent="-285750">
+              <a:buFont typeface="Arial" panose="020B0604020202020204" pitchFamily="34" charset="0"/>
+              <a:buChar char="•"/>
+            </a:pPr>
+            <a:r>
+              <a:rPr lang="es-ES" dirty="0">
+                <a:solidFill>
+                  <a:schemeClr val="bg1"/>
+                </a:solidFill>
+              </a:rPr>
+              <a:t>Garantías de seguridad y privacidad de la información.</a:t>
+            </a:r>
+            <a:endParaRPr lang="es-CO" dirty="0">
+              <a:solidFill>
+                <a:schemeClr val="bg1"/>
+              </a:solidFill>
+            </a:endParaRPr>
+          </a:p>
+          <a:p>
+            <a:endParaRPr lang="es-CO" dirty="0">
+              <a:solidFill>
+                <a:schemeClr val="bg1"/>
+              </a:solidFill>
+            </a:endParaRPr>
+          </a:p>
+        </p:txBody>
+      </p:sp>
+      <p:sp>
+        <p:nvSpPr>
+          <p:cNvPr id="13" name="Flecha: curvada hacia arriba 12">
+            <a:extLst>
+              <a:ext uri="{FF2B5EF4-FFF2-40B4-BE49-F238E27FC236}">
+                <a16:creationId xmlns:a16="http://schemas.microsoft.com/office/drawing/2014/main" id="{BA19105A-27D7-48F2-A1E8-296489138B4C}"/>
+              </a:ext>
+            </a:extLst>
+          </p:cNvPr>
+          <p:cNvSpPr/>
+          <p:nvPr/>
+        </p:nvSpPr>
+        <p:spPr>
+          <a:xfrm>
+            <a:off x="3367088" y="5414158"/>
+            <a:ext cx="4976812" cy="1443841"/>
+          </a:xfrm>
+          <a:prstGeom prst="curvedUpArrow">
+            <a:avLst>
+              <a:gd name="adj1" fmla="val 19952"/>
+              <a:gd name="adj2" fmla="val 50000"/>
+              <a:gd name="adj3" fmla="val 43890"/>
+            </a:avLst>
+          </a:prstGeom>
+        </p:spPr>
+        <p:style>
+          <a:lnRef idx="2">
+            <a:schemeClr val="accent6"/>
+          </a:lnRef>
+          <a:fillRef idx="1">
+            <a:schemeClr val="lt1"/>
+          </a:fillRef>
+          <a:effectRef idx="0">
+            <a:schemeClr val="accent6"/>
+          </a:effectRef>
+          <a:fontRef idx="minor">
+            <a:schemeClr val="dk1"/>
+          </a:fontRef>
+        </p:style>
+        <p:txBody>
+          <a:bodyPr rtlCol="0" anchor="ctr"/>
+          <a:lstStyle/>
+          <a:p>
+            <a:pPr algn="ctr"/>
+            <a:endParaRPr lang="es-CO">
+              <a:solidFill>
+                <a:schemeClr val="tx1"/>
+              </a:solidFill>
+            </a:endParaRPr>
+          </a:p>
+        </p:txBody>
+      </p:sp>
+      <p:pic>
+        <p:nvPicPr>
+          <p:cNvPr id="15" name="Gráfico 14" descr="Internet con relleno sólido">
+            <a:extLst>
+              <a:ext uri="{FF2B5EF4-FFF2-40B4-BE49-F238E27FC236}">
+                <a16:creationId xmlns:a16="http://schemas.microsoft.com/office/drawing/2014/main" id="{6EC42FC6-7A25-4A84-AA63-553A3AA7D369}"/>
+              </a:ext>
+            </a:extLst>
+          </p:cNvPr>
+          <p:cNvPicPr>
+            <a:picLocks noChangeAspect="1"/>
+          </p:cNvPicPr>
+          <p:nvPr/>
+        </p:nvPicPr>
+        <p:blipFill>
+          <a:blip r:embed="rId3">
+            <a:extLst>
+              <a:ext uri="{28A0092B-C50C-407E-A947-70E740481C1C}">
+                <a14:useLocalDpi xmlns:a14="http://schemas.microsoft.com/office/drawing/2010/main" val="0"/>
+              </a:ext>
+              <a:ext uri="{96DAC541-7B7A-43D3-8B79-37D633B846F1}">
+                <asvg:svgBlip xmlns:asvg="http://schemas.microsoft.com/office/drawing/2016/SVG/main" r:embed="rId4"/>
+              </a:ext>
+            </a:extLst>
+          </a:blip>
+          <a:stretch>
+            <a:fillRect/>
+          </a:stretch>
+        </p:blipFill>
+        <p:spPr>
+          <a:xfrm>
+            <a:off x="5439977" y="5738345"/>
+            <a:ext cx="914400" cy="914400"/>
+          </a:xfrm>
+          <a:prstGeom prst="rect">
+            <a:avLst/>
+          </a:prstGeom>
+        </p:spPr>
+      </p:pic>
+      <p:pic>
+        <p:nvPicPr>
+          <p:cNvPr id="17" name="Gráfico 16" descr="Informática en la nube con relleno sólido">
+            <a:extLst>
+              <a:ext uri="{FF2B5EF4-FFF2-40B4-BE49-F238E27FC236}">
+                <a16:creationId xmlns:a16="http://schemas.microsoft.com/office/drawing/2014/main" id="{73E4625D-101D-4020-811F-DEA3EEC8D266}"/>
+              </a:ext>
+            </a:extLst>
+          </p:cNvPr>
+          <p:cNvPicPr>
+            <a:picLocks noChangeAspect="1"/>
+          </p:cNvPicPr>
+          <p:nvPr/>
+        </p:nvPicPr>
+        <p:blipFill>
+          <a:blip r:embed="rId5">
+            <a:extLst>
+              <a:ext uri="{28A0092B-C50C-407E-A947-70E740481C1C}">
+                <a14:useLocalDpi xmlns:a14="http://schemas.microsoft.com/office/drawing/2010/main" val="0"/>
+              </a:ext>
+              <a:ext uri="{96DAC541-7B7A-43D3-8B79-37D633B846F1}">
+                <asvg:svgBlip xmlns:asvg="http://schemas.microsoft.com/office/drawing/2016/SVG/main" r:embed="rId6"/>
+              </a:ext>
+            </a:extLst>
+          </a:blip>
+          <a:stretch>
+            <a:fillRect/>
+          </a:stretch>
+        </p:blipFill>
+        <p:spPr>
+          <a:xfrm>
+            <a:off x="4528537" y="5634770"/>
+            <a:ext cx="914400" cy="914400"/>
+          </a:xfrm>
+          <a:prstGeom prst="rect">
+            <a:avLst/>
+          </a:prstGeom>
+        </p:spPr>
+      </p:pic>
+      <p:pic>
+        <p:nvPicPr>
+          <p:cNvPr id="19" name="Gráfico 18" descr="Robot con relleno sólido">
+            <a:extLst>
+              <a:ext uri="{FF2B5EF4-FFF2-40B4-BE49-F238E27FC236}">
+                <a16:creationId xmlns:a16="http://schemas.microsoft.com/office/drawing/2014/main" id="{6A88425B-4879-4DB3-8447-398344B603F8}"/>
+              </a:ext>
+            </a:extLst>
+          </p:cNvPr>
+          <p:cNvPicPr>
+            <a:picLocks noChangeAspect="1"/>
+          </p:cNvPicPr>
+          <p:nvPr/>
+        </p:nvPicPr>
+        <p:blipFill>
+          <a:blip r:embed="rId7">
+            <a:extLst>
+              <a:ext uri="{28A0092B-C50C-407E-A947-70E740481C1C}">
+                <a14:useLocalDpi xmlns:a14="http://schemas.microsoft.com/office/drawing/2010/main" val="0"/>
+              </a:ext>
+              <a:ext uri="{96DAC541-7B7A-43D3-8B79-37D633B846F1}">
+                <asvg:svgBlip xmlns:asvg="http://schemas.microsoft.com/office/drawing/2016/SVG/main" r:embed="rId8"/>
+              </a:ext>
+            </a:extLst>
+          </a:blip>
+          <a:stretch>
+            <a:fillRect/>
+          </a:stretch>
+        </p:blipFill>
+        <p:spPr>
+          <a:xfrm>
+            <a:off x="6294824" y="5663345"/>
+            <a:ext cx="914400" cy="914400"/>
+          </a:xfrm>
+          <a:prstGeom prst="rect">
+            <a:avLst/>
+          </a:prstGeom>
+        </p:spPr>
+      </p:pic>
+      <p:sp>
+        <p:nvSpPr>
+          <p:cNvPr id="20" name="CuadroTexto 19">
+            <a:extLst>
+              <a:ext uri="{FF2B5EF4-FFF2-40B4-BE49-F238E27FC236}">
+                <a16:creationId xmlns:a16="http://schemas.microsoft.com/office/drawing/2014/main" id="{62F2D9C7-8CF0-4EDF-8C92-BEEB43434842}"/>
+              </a:ext>
+            </a:extLst>
+          </p:cNvPr>
+          <p:cNvSpPr txBox="1"/>
+          <p:nvPr/>
+        </p:nvSpPr>
+        <p:spPr>
+          <a:xfrm>
+            <a:off x="8217394" y="6091970"/>
+            <a:ext cx="2933700" cy="523220"/>
+          </a:xfrm>
+          <a:prstGeom prst="rect">
+            <a:avLst/>
+          </a:prstGeom>
+          <a:solidFill>
+            <a:srgbClr val="FF0000"/>
+          </a:solidFill>
+        </p:spPr>
+        <p:style>
+          <a:lnRef idx="0">
+            <a:schemeClr val="accent4"/>
+          </a:lnRef>
+          <a:fillRef idx="3">
+            <a:schemeClr val="accent4"/>
+          </a:fillRef>
+          <a:effectRef idx="3">
+            <a:schemeClr val="accent4"/>
+          </a:effectRef>
+          <a:fontRef idx="minor">
+            <a:schemeClr val="lt1"/>
+          </a:fontRef>
+        </p:style>
+        <p:txBody>
+          <a:bodyPr wrap="square" rtlCol="0">
+            <a:spAutoFit/>
+          </a:bodyPr>
+          <a:lstStyle/>
+          <a:p>
+            <a:pPr algn="ctr"/>
+            <a:r>
+              <a:rPr lang="es-ES" sz="2800" dirty="0"/>
+              <a:t>Desafíos</a:t>
+            </a:r>
+            <a:endParaRPr lang="es-CO" sz="2800" dirty="0"/>
           </a:p>
         </p:txBody>
       </p:sp>
     </p:spTree>
     <p:extLst>
       <p:ext uri="{BB962C8B-B14F-4D97-AF65-F5344CB8AC3E}">
-        <p14:creationId xmlns:p14="http://schemas.microsoft.com/office/powerpoint/2010/main" val="1633117414"/>
+        <p14:creationId xmlns:p14="http://schemas.microsoft.com/office/powerpoint/2010/main" val="940589705"/>
       </p:ext>
     </p:extLst>
   </p:cSld>
@@ -8864,30 +10317,151 @@
           <a:chExt cx="0" cy="0"/>
         </a:xfrm>
       </p:grpSpPr>
-      <p:sp>
-        <p:nvSpPr>
-          <p:cNvPr id="2" name="Título 1">
-            <a:extLst>
-              <a:ext uri="{FF2B5EF4-FFF2-40B4-BE49-F238E27FC236}">
-                <a16:creationId xmlns:a16="http://schemas.microsoft.com/office/drawing/2014/main" id="{21CE44BB-D189-4E76-9EBB-B0E694634822}"/>
-              </a:ext>
-            </a:extLst>
-          </p:cNvPr>
-          <p:cNvSpPr>
-            <a:spLocks noGrp="1"/>
-          </p:cNvSpPr>
-          <p:nvPr>
-            <p:ph type="title"/>
-          </p:nvPr>
-        </p:nvSpPr>
-        <p:spPr/>
-        <p:txBody>
-          <a:bodyPr/>
+      <p:pic>
+        <p:nvPicPr>
+          <p:cNvPr id="3076" name="Picture 4">
+            <a:extLst>
+              <a:ext uri="{FF2B5EF4-FFF2-40B4-BE49-F238E27FC236}">
+                <a16:creationId xmlns:a16="http://schemas.microsoft.com/office/drawing/2014/main" id="{403EF3F3-64A8-4D70-BD65-26B25CB851FF}"/>
+              </a:ext>
+            </a:extLst>
+          </p:cNvPr>
+          <p:cNvPicPr>
+            <a:picLocks noChangeAspect="1" noChangeArrowheads="1"/>
+          </p:cNvPicPr>
+          <p:nvPr/>
+        </p:nvPicPr>
+        <p:blipFill>
+          <a:blip r:embed="rId2">
+            <a:extLst>
+              <a:ext uri="{28A0092B-C50C-407E-A947-70E740481C1C}">
+                <a14:useLocalDpi xmlns:a14="http://schemas.microsoft.com/office/drawing/2010/main" val="0"/>
+              </a:ext>
+            </a:extLst>
+          </a:blip>
+          <a:srcRect/>
+          <a:stretch>
+            <a:fillRect/>
+          </a:stretch>
+        </p:blipFill>
+        <p:spPr bwMode="auto">
+          <a:xfrm>
+            <a:off x="0" y="0"/>
+            <a:ext cx="12192000" cy="6858000"/>
+          </a:xfrm>
+          <a:prstGeom prst="rect">
+            <a:avLst/>
+          </a:prstGeom>
+          <a:noFill/>
+          <a:extLst>
+            <a:ext uri="{909E8E84-426E-40DD-AFC4-6F175D3DCCD1}">
+              <a14:hiddenFill xmlns:a14="http://schemas.microsoft.com/office/drawing/2010/main">
+                <a:solidFill>
+                  <a:srgbClr val="FFFFFF"/>
+                </a:solidFill>
+              </a14:hiddenFill>
+            </a:ext>
+          </a:extLst>
+        </p:spPr>
+      </p:pic>
+      <p:sp>
+        <p:nvSpPr>
+          <p:cNvPr id="8" name="CuadroTexto 7">
+            <a:extLst>
+              <a:ext uri="{FF2B5EF4-FFF2-40B4-BE49-F238E27FC236}">
+                <a16:creationId xmlns:a16="http://schemas.microsoft.com/office/drawing/2014/main" id="{D078429F-8DB6-49D5-88F0-832F055DB3A5}"/>
+              </a:ext>
+            </a:extLst>
+          </p:cNvPr>
+          <p:cNvSpPr txBox="1"/>
+          <p:nvPr/>
+        </p:nvSpPr>
+        <p:spPr>
+          <a:xfrm>
+            <a:off x="304800" y="19050"/>
+            <a:ext cx="11582400" cy="923330"/>
+          </a:xfrm>
+          <a:prstGeom prst="rect">
+            <a:avLst/>
+          </a:prstGeom>
+          <a:noFill/>
+        </p:spPr>
+        <p:txBody>
+          <a:bodyPr wrap="square" rtlCol="0">
+            <a:spAutoFit/>
+          </a:bodyPr>
           <a:lstStyle/>
           <a:p>
-            <a:r>
-              <a:rPr lang="es-MX" dirty="0"/>
-              <a:t>2. Privacidad y protección de datos</a:t>
+            <a:pPr algn="ctr"/>
+            <a:r>
+              <a:rPr lang="es-ES" sz="5400" b="1" dirty="0">
+                <a:solidFill>
+                  <a:schemeClr val="bg1"/>
+                </a:solidFill>
+              </a:rPr>
+              <a:t>Privacidad y protección de información</a:t>
+            </a:r>
+            <a:endParaRPr lang="es-CO" sz="5400" b="1" dirty="0">
+              <a:solidFill>
+                <a:schemeClr val="bg1"/>
+              </a:solidFill>
+            </a:endParaRPr>
+          </a:p>
+        </p:txBody>
+      </p:sp>
+      <p:sp>
+        <p:nvSpPr>
+          <p:cNvPr id="6" name="CuadroTexto 5">
+            <a:extLst>
+              <a:ext uri="{FF2B5EF4-FFF2-40B4-BE49-F238E27FC236}">
+                <a16:creationId xmlns:a16="http://schemas.microsoft.com/office/drawing/2014/main" id="{9AFD180D-E730-4B7B-8CE7-D5A9905D833D}"/>
+              </a:ext>
+            </a:extLst>
+          </p:cNvPr>
+          <p:cNvSpPr txBox="1"/>
+          <p:nvPr/>
+        </p:nvSpPr>
+        <p:spPr>
+          <a:xfrm>
+            <a:off x="133349" y="2028826"/>
+            <a:ext cx="3590926" cy="646331"/>
+          </a:xfrm>
+          <a:prstGeom prst="rect">
+            <a:avLst/>
+          </a:prstGeom>
+          <a:solidFill>
+            <a:schemeClr val="accent1">
+              <a:alpha val="50000"/>
+            </a:schemeClr>
+          </a:solidFill>
+          <a:ln>
+            <a:noFill/>
+          </a:ln>
+        </p:spPr>
+        <p:style>
+          <a:lnRef idx="0">
+            <a:scrgbClr r="0" g="0" b="0"/>
+          </a:lnRef>
+          <a:fillRef idx="0">
+            <a:scrgbClr r="0" g="0" b="0"/>
+          </a:fillRef>
+          <a:effectRef idx="0">
+            <a:scrgbClr r="0" g="0" b="0"/>
+          </a:effectRef>
+          <a:fontRef idx="minor">
+            <a:schemeClr val="lt1"/>
+          </a:fontRef>
+        </p:style>
+        <p:txBody>
+          <a:bodyPr wrap="square" rtlCol="0">
+            <a:spAutoFit/>
+          </a:bodyPr>
+          <a:lstStyle/>
+          <a:p>
+            <a:pPr algn="ctr"/>
+            <a:r>
+              <a:rPr lang="es-ES" dirty="0"/>
+              <a:t>Centralización vs. Descentralización de identidades</a:t>
             </a:r>
             <a:endParaRPr lang="es-CO" dirty="0"/>
           </a:p>
@@ -8895,25 +10469,232 @@
       </p:sp>
       <p:sp>
         <p:nvSpPr>
-          <p:cNvPr id="3" name="Marcador de contenido 2">
-            <a:extLst>
-              <a:ext uri="{FF2B5EF4-FFF2-40B4-BE49-F238E27FC236}">
-                <a16:creationId xmlns:a16="http://schemas.microsoft.com/office/drawing/2014/main" id="{9D312866-685F-4E6E-832E-D9072C52ADA1}"/>
-              </a:ext>
-            </a:extLst>
-          </p:cNvPr>
-          <p:cNvSpPr>
-            <a:spLocks noGrp="1"/>
-          </p:cNvSpPr>
-          <p:nvPr>
-            <p:ph idx="1"/>
-          </p:nvPr>
-        </p:nvSpPr>
-        <p:spPr/>
-        <p:txBody>
-          <a:bodyPr/>
+          <p:cNvPr id="10" name="CuadroTexto 9">
+            <a:extLst>
+              <a:ext uri="{FF2B5EF4-FFF2-40B4-BE49-F238E27FC236}">
+                <a16:creationId xmlns:a16="http://schemas.microsoft.com/office/drawing/2014/main" id="{E30BB307-5FE0-4A59-A19B-A49ACA9D4385}"/>
+              </a:ext>
+            </a:extLst>
+          </p:cNvPr>
+          <p:cNvSpPr txBox="1"/>
+          <p:nvPr/>
+        </p:nvSpPr>
+        <p:spPr>
+          <a:xfrm>
+            <a:off x="4300537" y="5800726"/>
+            <a:ext cx="3590926" cy="646331"/>
+          </a:xfrm>
+          <a:prstGeom prst="rect">
+            <a:avLst/>
+          </a:prstGeom>
+          <a:solidFill>
+            <a:schemeClr val="accent1">
+              <a:alpha val="50000"/>
+            </a:schemeClr>
+          </a:solidFill>
+          <a:ln>
+            <a:noFill/>
+          </a:ln>
+        </p:spPr>
+        <p:style>
+          <a:lnRef idx="0">
+            <a:scrgbClr r="0" g="0" b="0"/>
+          </a:lnRef>
+          <a:fillRef idx="0">
+            <a:scrgbClr r="0" g="0" b="0"/>
+          </a:fillRef>
+          <a:effectRef idx="0">
+            <a:scrgbClr r="0" g="0" b="0"/>
+          </a:effectRef>
+          <a:fontRef idx="minor">
+            <a:schemeClr val="lt1"/>
+          </a:fontRef>
+        </p:style>
+        <p:txBody>
+          <a:bodyPr wrap="square" rtlCol="0">
+            <a:spAutoFit/>
+          </a:bodyPr>
           <a:lstStyle/>
           <a:p>
+            <a:pPr algn="ctr"/>
+            <a:r>
+              <a:rPr lang="es-ES" dirty="0"/>
+              <a:t>Uso inadecuado de datos personales</a:t>
+            </a:r>
+          </a:p>
+          <a:p>
+            <a:pPr algn="ctr"/>
+            <a:r>
+              <a:rPr lang="es-ES" dirty="0"/>
+              <a:t>(Usabilidad)</a:t>
+            </a:r>
+            <a:endParaRPr lang="es-CO" dirty="0"/>
+          </a:p>
+        </p:txBody>
+      </p:sp>
+      <p:sp>
+        <p:nvSpPr>
+          <p:cNvPr id="11" name="CuadroTexto 10">
+            <a:extLst>
+              <a:ext uri="{FF2B5EF4-FFF2-40B4-BE49-F238E27FC236}">
+                <a16:creationId xmlns:a16="http://schemas.microsoft.com/office/drawing/2014/main" id="{C06CC2D3-D803-4815-921A-11CA1A33AE4A}"/>
+              </a:ext>
+            </a:extLst>
+          </p:cNvPr>
+          <p:cNvSpPr txBox="1"/>
+          <p:nvPr/>
+        </p:nvSpPr>
+        <p:spPr>
+          <a:xfrm>
+            <a:off x="323848" y="5800726"/>
+            <a:ext cx="3590926" cy="646331"/>
+          </a:xfrm>
+          <a:prstGeom prst="rect">
+            <a:avLst/>
+          </a:prstGeom>
+          <a:solidFill>
+            <a:schemeClr val="accent1">
+              <a:alpha val="50000"/>
+            </a:schemeClr>
+          </a:solidFill>
+          <a:ln>
+            <a:noFill/>
+          </a:ln>
+        </p:spPr>
+        <p:style>
+          <a:lnRef idx="0">
+            <a:scrgbClr r="0" g="0" b="0"/>
+          </a:lnRef>
+          <a:fillRef idx="0">
+            <a:scrgbClr r="0" g="0" b="0"/>
+          </a:fillRef>
+          <a:effectRef idx="0">
+            <a:scrgbClr r="0" g="0" b="0"/>
+          </a:effectRef>
+          <a:fontRef idx="minor">
+            <a:schemeClr val="lt1"/>
+          </a:fontRef>
+        </p:style>
+        <p:txBody>
+          <a:bodyPr wrap="square" rtlCol="0">
+            <a:spAutoFit/>
+          </a:bodyPr>
+          <a:lstStyle/>
+          <a:p>
+            <a:pPr algn="ctr"/>
+            <a:r>
+              <a:rPr lang="es-ES" dirty="0"/>
+              <a:t>Fuga de datos y violaciones de privacidad</a:t>
+            </a:r>
+            <a:endParaRPr lang="es-CO" dirty="0"/>
+          </a:p>
+        </p:txBody>
+      </p:sp>
+      <p:sp>
+        <p:nvSpPr>
+          <p:cNvPr id="12" name="CuadroTexto 11">
+            <a:extLst>
+              <a:ext uri="{FF2B5EF4-FFF2-40B4-BE49-F238E27FC236}">
+                <a16:creationId xmlns:a16="http://schemas.microsoft.com/office/drawing/2014/main" id="{B2C2FFE5-44AA-4999-8FC6-D86451D0E87E}"/>
+              </a:ext>
+            </a:extLst>
+          </p:cNvPr>
+          <p:cNvSpPr txBox="1"/>
+          <p:nvPr/>
+        </p:nvSpPr>
+        <p:spPr>
+          <a:xfrm>
+            <a:off x="8277226" y="5800726"/>
+            <a:ext cx="3590926" cy="646331"/>
+          </a:xfrm>
+          <a:prstGeom prst="rect">
+            <a:avLst/>
+          </a:prstGeom>
+          <a:solidFill>
+            <a:schemeClr val="accent1">
+              <a:alpha val="50000"/>
+            </a:schemeClr>
+          </a:solidFill>
+          <a:ln>
+            <a:noFill/>
+          </a:ln>
+        </p:spPr>
+        <p:style>
+          <a:lnRef idx="0">
+            <a:scrgbClr r="0" g="0" b="0"/>
+          </a:lnRef>
+          <a:fillRef idx="0">
+            <a:scrgbClr r="0" g="0" b="0"/>
+          </a:fillRef>
+          <a:effectRef idx="0">
+            <a:scrgbClr r="0" g="0" b="0"/>
+          </a:effectRef>
+          <a:fontRef idx="minor">
+            <a:schemeClr val="lt1"/>
+          </a:fontRef>
+        </p:style>
+        <p:txBody>
+          <a:bodyPr wrap="square" rtlCol="0">
+            <a:spAutoFit/>
+          </a:bodyPr>
+          <a:lstStyle/>
+          <a:p>
+            <a:pPr algn="ctr"/>
+            <a:r>
+              <a:rPr lang="es-CO" dirty="0"/>
+              <a:t>Cumplimiento de normativas globales</a:t>
+            </a:r>
+          </a:p>
+        </p:txBody>
+      </p:sp>
+      <p:sp>
+        <p:nvSpPr>
+          <p:cNvPr id="7" name="Flecha: hacia abajo 6">
+            <a:extLst>
+              <a:ext uri="{FF2B5EF4-FFF2-40B4-BE49-F238E27FC236}">
+                <a16:creationId xmlns:a16="http://schemas.microsoft.com/office/drawing/2014/main" id="{0351690C-E838-4A33-A538-52433C6BD134}"/>
+              </a:ext>
+            </a:extLst>
+          </p:cNvPr>
+          <p:cNvSpPr/>
+          <p:nvPr/>
+        </p:nvSpPr>
+        <p:spPr>
+          <a:xfrm>
+            <a:off x="1600198" y="2905125"/>
+            <a:ext cx="519113" cy="2609850"/>
+          </a:xfrm>
+          <a:prstGeom prst="downArrow">
+            <a:avLst/>
+          </a:prstGeom>
+          <a:solidFill>
+            <a:schemeClr val="accent1">
+              <a:alpha val="50000"/>
+            </a:schemeClr>
+          </a:solidFill>
+          <a:ln>
+            <a:noFill/>
+          </a:ln>
+        </p:spPr>
+        <p:style>
+          <a:lnRef idx="0">
+            <a:scrgbClr r="0" g="0" b="0"/>
+          </a:lnRef>
+          <a:fillRef idx="0">
+            <a:scrgbClr r="0" g="0" b="0"/>
+          </a:fillRef>
+          <a:effectRef idx="0">
+            <a:scrgbClr r="0" g="0" b="0"/>
+          </a:effectRef>
+          <a:fontRef idx="minor">
+            <a:schemeClr val="lt1"/>
+          </a:fontRef>
+        </p:style>
+        <p:txBody>
+          <a:bodyPr rtlCol="0" anchor="ctr"/>
+          <a:lstStyle/>
+          <a:p>
+            <a:pPr algn="ctr"/>
             <a:endParaRPr lang="es-CO"/>
           </a:p>
         </p:txBody>
@@ -8921,7 +10702,7 @@
     </p:spTree>
     <p:extLst>
       <p:ext uri="{BB962C8B-B14F-4D97-AF65-F5344CB8AC3E}">
-        <p14:creationId xmlns:p14="http://schemas.microsoft.com/office/powerpoint/2010/main" val="3824686634"/>
+        <p14:creationId xmlns:p14="http://schemas.microsoft.com/office/powerpoint/2010/main" val="1959432329"/>
       </p:ext>
     </p:extLst>
   </p:cSld>
@@ -8961,7 +10742,7 @@
           <p:cNvPr id="2" name="Título 1">
             <a:extLst>
               <a:ext uri="{FF2B5EF4-FFF2-40B4-BE49-F238E27FC236}">
-                <a16:creationId xmlns:a16="http://schemas.microsoft.com/office/drawing/2014/main" id="{E2DF751F-6D7F-46EC-B522-718056DB396E}"/>
+                <a16:creationId xmlns:a16="http://schemas.microsoft.com/office/drawing/2014/main" id="{5B16F082-CFE2-41C8-98CA-8E6376D0D047}"/>
               </a:ext>
             </a:extLst>
           </p:cNvPr>
@@ -8979,8 +10760,11 @@
           <a:p>
             <a:r>
               <a:rPr lang="es-MX" dirty="0"/>
-              <a:t>Enrique</a:t>
-            </a:r>
+              <a:t>1:Evolución de la identidad digital</a:t>
+            </a:r>
+            <a:br>
+              <a:rPr lang="es-MX" dirty="0"/>
+            </a:br>
             <a:endParaRPr lang="es-CO" dirty="0"/>
           </a:p>
         </p:txBody>
@@ -8990,7 +10774,7 @@
           <p:cNvPr id="3" name="Marcador de contenido 2">
             <a:extLst>
               <a:ext uri="{FF2B5EF4-FFF2-40B4-BE49-F238E27FC236}">
-                <a16:creationId xmlns:a16="http://schemas.microsoft.com/office/drawing/2014/main" id="{750E137D-099F-43D6-8CA2-EB1A916A252B}"/>
+                <a16:creationId xmlns:a16="http://schemas.microsoft.com/office/drawing/2014/main" id="{44712DC9-686C-444F-8CD8-ACDBDE10001D}"/>
               </a:ext>
             </a:extLst>
           </p:cNvPr>
@@ -9013,7 +10797,7 @@
     </p:spTree>
     <p:extLst>
       <p:ext uri="{BB962C8B-B14F-4D97-AF65-F5344CB8AC3E}">
-        <p14:creationId xmlns:p14="http://schemas.microsoft.com/office/powerpoint/2010/main" val="121238447"/>
+        <p14:creationId xmlns:p14="http://schemas.microsoft.com/office/powerpoint/2010/main" val="1633117414"/>
       </p:ext>
     </p:extLst>
   </p:cSld>
@@ -9053,7 +10837,7 @@
           <p:cNvPr id="2" name="Título 1">
             <a:extLst>
               <a:ext uri="{FF2B5EF4-FFF2-40B4-BE49-F238E27FC236}">
-                <a16:creationId xmlns:a16="http://schemas.microsoft.com/office/drawing/2014/main" id="{04C1A636-D3A2-4FA3-ADBF-CF55EC8AD1BE}"/>
+                <a16:creationId xmlns:a16="http://schemas.microsoft.com/office/drawing/2014/main" id="{21CE44BB-D189-4E76-9EBB-B0E694634822}"/>
               </a:ext>
             </a:extLst>
           </p:cNvPr>
@@ -9071,7 +10855,7 @@
           <a:p>
             <a:r>
               <a:rPr lang="es-MX" dirty="0"/>
-              <a:t>3. Interoperabilidad</a:t>
+              <a:t>2. Privacidad y protección de datos</a:t>
             </a:r>
             <a:endParaRPr lang="es-CO" dirty="0"/>
           </a:p>
@@ -9082,7 +10866,7 @@
           <p:cNvPr id="3" name="Marcador de contenido 2">
             <a:extLst>
               <a:ext uri="{FF2B5EF4-FFF2-40B4-BE49-F238E27FC236}">
-                <a16:creationId xmlns:a16="http://schemas.microsoft.com/office/drawing/2014/main" id="{5BADBB80-1CBF-445F-91DD-84C4F76158C4}"/>
+                <a16:creationId xmlns:a16="http://schemas.microsoft.com/office/drawing/2014/main" id="{9D312866-685F-4E6E-832E-D9072C52ADA1}"/>
               </a:ext>
             </a:extLst>
           </p:cNvPr>
@@ -9105,7 +10889,7 @@
     </p:spTree>
     <p:extLst>
       <p:ext uri="{BB962C8B-B14F-4D97-AF65-F5344CB8AC3E}">
-        <p14:creationId xmlns:p14="http://schemas.microsoft.com/office/powerpoint/2010/main" val="3638649812"/>
+        <p14:creationId xmlns:p14="http://schemas.microsoft.com/office/powerpoint/2010/main" val="3824686634"/>
       </p:ext>
     </p:extLst>
   </p:cSld>
@@ -9145,7 +10929,7 @@
           <p:cNvPr id="2" name="Título 1">
             <a:extLst>
               <a:ext uri="{FF2B5EF4-FFF2-40B4-BE49-F238E27FC236}">
-                <a16:creationId xmlns:a16="http://schemas.microsoft.com/office/drawing/2014/main" id="{141575A2-32DE-424C-A701-5330758742F2}"/>
+                <a16:creationId xmlns:a16="http://schemas.microsoft.com/office/drawing/2014/main" id="{E2DF751F-6D7F-46EC-B522-718056DB396E}"/>
               </a:ext>
             </a:extLst>
           </p:cNvPr>
@@ -9163,7 +10947,7 @@
           <a:p>
             <a:r>
               <a:rPr lang="es-MX" dirty="0"/>
-              <a:t>4. Seguridad y fraude</a:t>
+              <a:t>Enrique</a:t>
             </a:r>
             <a:endParaRPr lang="es-CO" dirty="0"/>
           </a:p>
@@ -9174,7 +10958,7 @@
           <p:cNvPr id="3" name="Marcador de contenido 2">
             <a:extLst>
               <a:ext uri="{FF2B5EF4-FFF2-40B4-BE49-F238E27FC236}">
-                <a16:creationId xmlns:a16="http://schemas.microsoft.com/office/drawing/2014/main" id="{D4A48BB2-44AA-4BDC-AE5E-47FB5B869CC6}"/>
+                <a16:creationId xmlns:a16="http://schemas.microsoft.com/office/drawing/2014/main" id="{750E137D-099F-43D6-8CA2-EB1A916A252B}"/>
               </a:ext>
             </a:extLst>
           </p:cNvPr>
@@ -9197,7 +10981,7 @@
     </p:spTree>
     <p:extLst>
       <p:ext uri="{BB962C8B-B14F-4D97-AF65-F5344CB8AC3E}">
-        <p14:creationId xmlns:p14="http://schemas.microsoft.com/office/powerpoint/2010/main" val="3909752439"/>
+        <p14:creationId xmlns:p14="http://schemas.microsoft.com/office/powerpoint/2010/main" val="121238447"/>
       </p:ext>
     </p:extLst>
   </p:cSld>
@@ -9237,7 +11021,7 @@
           <p:cNvPr id="2" name="Título 1">
             <a:extLst>
               <a:ext uri="{FF2B5EF4-FFF2-40B4-BE49-F238E27FC236}">
-                <a16:creationId xmlns:a16="http://schemas.microsoft.com/office/drawing/2014/main" id="{C96D7D7A-8958-4FA2-B276-117158E345E0}"/>
+                <a16:creationId xmlns:a16="http://schemas.microsoft.com/office/drawing/2014/main" id="{04C1A636-D3A2-4FA3-ADBF-CF55EC8AD1BE}"/>
               </a:ext>
             </a:extLst>
           </p:cNvPr>
@@ -9254,12 +11038,8 @@
           <a:lstStyle/>
           <a:p>
             <a:r>
-              <a:rPr lang="es-MX" dirty="0" err="1"/>
-              <a:t>Raul</a:t>
-            </a:r>
-            <a:r>
               <a:rPr lang="es-MX" dirty="0"/>
-              <a:t> Garay</a:t>
+              <a:t>3. Interoperabilidad</a:t>
             </a:r>
             <a:endParaRPr lang="es-CO" dirty="0"/>
           </a:p>
@@ -9270,7 +11050,7 @@
           <p:cNvPr id="3" name="Marcador de contenido 2">
             <a:extLst>
               <a:ext uri="{FF2B5EF4-FFF2-40B4-BE49-F238E27FC236}">
-                <a16:creationId xmlns:a16="http://schemas.microsoft.com/office/drawing/2014/main" id="{80C5BB57-E45C-47FD-8AC8-E5D3BE66B2A4}"/>
+                <a16:creationId xmlns:a16="http://schemas.microsoft.com/office/drawing/2014/main" id="{5BADBB80-1CBF-445F-91DD-84C4F76158C4}"/>
               </a:ext>
             </a:extLst>
           </p:cNvPr>
@@ -9293,7 +11073,7 @@
     </p:spTree>
     <p:extLst>
       <p:ext uri="{BB962C8B-B14F-4D97-AF65-F5344CB8AC3E}">
-        <p14:creationId xmlns:p14="http://schemas.microsoft.com/office/powerpoint/2010/main" val="2095245258"/>
+        <p14:creationId xmlns:p14="http://schemas.microsoft.com/office/powerpoint/2010/main" val="3638649812"/>
       </p:ext>
     </p:extLst>
   </p:cSld>
@@ -9333,7 +11113,7 @@
           <p:cNvPr id="2" name="Título 1">
             <a:extLst>
               <a:ext uri="{FF2B5EF4-FFF2-40B4-BE49-F238E27FC236}">
-                <a16:creationId xmlns:a16="http://schemas.microsoft.com/office/drawing/2014/main" id="{075B7DE7-63C5-48E2-ABD6-C29042A28050}"/>
+                <a16:creationId xmlns:a16="http://schemas.microsoft.com/office/drawing/2014/main" id="{141575A2-32DE-424C-A701-5330758742F2}"/>
               </a:ext>
             </a:extLst>
           </p:cNvPr>
@@ -9351,7 +11131,7 @@
           <a:p>
             <a:r>
               <a:rPr lang="es-MX" dirty="0"/>
-              <a:t>5.	Autenticación y acceso</a:t>
+              <a:t>4. Seguridad y fraude</a:t>
             </a:r>
             <a:endParaRPr lang="es-CO" dirty="0"/>
           </a:p>
@@ -9362,7 +11142,7 @@
           <p:cNvPr id="3" name="Marcador de contenido 2">
             <a:extLst>
               <a:ext uri="{FF2B5EF4-FFF2-40B4-BE49-F238E27FC236}">
-                <a16:creationId xmlns:a16="http://schemas.microsoft.com/office/drawing/2014/main" id="{39C09A13-4035-4711-87ED-8DE3DE2ED9AA}"/>
+                <a16:creationId xmlns:a16="http://schemas.microsoft.com/office/drawing/2014/main" id="{D4A48BB2-44AA-4BDC-AE5E-47FB5B869CC6}"/>
               </a:ext>
             </a:extLst>
           </p:cNvPr>
@@ -9385,7 +11165,7 @@
     </p:spTree>
     <p:extLst>
       <p:ext uri="{BB962C8B-B14F-4D97-AF65-F5344CB8AC3E}">
-        <p14:creationId xmlns:p14="http://schemas.microsoft.com/office/powerpoint/2010/main" val="1600950127"/>
+        <p14:creationId xmlns:p14="http://schemas.microsoft.com/office/powerpoint/2010/main" val="3909752439"/>
       </p:ext>
     </p:extLst>
   </p:cSld>

</xml_diff>